<commit_message>
📦 NEW: rapport and minor fixs
</commit_message>
<xml_diff>
--- a/doc/Presentation.pptx
+++ b/doc/Presentation.pptx
@@ -7,6 +7,9 @@
   <p:notesMasterIdLst>
     <p:notesMasterId r:id="rId12"/>
   </p:notesMasterIdLst>
+  <p:handoutMasterIdLst>
+    <p:handoutMasterId r:id="rId13"/>
+  </p:handoutMasterIdLst>
   <p:sldIdLst>
     <p:sldId id="256" r:id="rId2"/>
     <p:sldId id="257" r:id="rId3"/>
@@ -124,6 +127,199 @@
 </p:presentation>
 </file>
 
+<file path=ppt/handoutMasters/handoutMaster1.xml><?xml version="1.0" encoding="utf-8"?>
+<p:handoutMaster xmlns:a="http://schemas.openxmlformats.org/drawingml/2006/main" xmlns:r="http://schemas.openxmlformats.org/officeDocument/2006/relationships" xmlns:p="http://schemas.openxmlformats.org/presentationml/2006/main">
+  <p:cSld>
+    <p:bg>
+      <p:bgRef idx="1001">
+        <a:schemeClr val="bg1"/>
+      </p:bgRef>
+    </p:bg>
+    <p:spTree>
+      <p:nvGrpSpPr>
+        <p:cNvPr id="1" name=""/>
+        <p:cNvGrpSpPr/>
+        <p:nvPr/>
+      </p:nvGrpSpPr>
+      <p:grpSpPr>
+        <a:xfrm>
+          <a:off x="0" y="0"/>
+          <a:ext cx="0" cy="0"/>
+          <a:chOff x="0" y="0"/>
+          <a:chExt cx="0" cy="0"/>
+        </a:xfrm>
+      </p:grpSpPr>
+      <p:sp>
+        <p:nvSpPr>
+          <p:cNvPr id="2" name="Espace réservé de l'en-tête 1">
+            <a:extLst>
+              <a:ext uri="{FF2B5EF4-FFF2-40B4-BE49-F238E27FC236}">
+                <a16:creationId xmlns:a16="http://schemas.microsoft.com/office/drawing/2014/main" id="{C5D3FC1E-50A7-4586-91CE-D1FAA4982C24}"/>
+              </a:ext>
+            </a:extLst>
+          </p:cNvPr>
+          <p:cNvSpPr>
+            <a:spLocks noGrp="1"/>
+          </p:cNvSpPr>
+          <p:nvPr>
+            <p:ph type="hdr" sz="quarter"/>
+          </p:nvPr>
+        </p:nvSpPr>
+        <p:spPr>
+          <a:xfrm>
+            <a:off x="0" y="0"/>
+            <a:ext cx="2971800" cy="458788"/>
+          </a:xfrm>
+          <a:prstGeom prst="rect">
+            <a:avLst/>
+          </a:prstGeom>
+        </p:spPr>
+        <p:txBody>
+          <a:bodyPr vert="horz" lIns="91440" tIns="45720" rIns="91440" bIns="45720" rtlCol="0"/>
+          <a:lstStyle>
+            <a:lvl1pPr algn="l">
+              <a:defRPr sz="1200"/>
+            </a:lvl1pPr>
+          </a:lstStyle>
+          <a:p>
+            <a:endParaRPr lang="en-US"/>
+          </a:p>
+        </p:txBody>
+      </p:sp>
+      <p:sp>
+        <p:nvSpPr>
+          <p:cNvPr id="3" name="Espace réservé de la date 2">
+            <a:extLst>
+              <a:ext uri="{FF2B5EF4-FFF2-40B4-BE49-F238E27FC236}">
+                <a16:creationId xmlns:a16="http://schemas.microsoft.com/office/drawing/2014/main" id="{2DE49D9B-365E-447B-936C-8FF3FC282174}"/>
+              </a:ext>
+            </a:extLst>
+          </p:cNvPr>
+          <p:cNvSpPr>
+            <a:spLocks noGrp="1"/>
+          </p:cNvSpPr>
+          <p:nvPr>
+            <p:ph type="dt" sz="quarter" idx="1"/>
+          </p:nvPr>
+        </p:nvSpPr>
+        <p:spPr>
+          <a:xfrm>
+            <a:off x="3884613" y="0"/>
+            <a:ext cx="2971800" cy="458788"/>
+          </a:xfrm>
+          <a:prstGeom prst="rect">
+            <a:avLst/>
+          </a:prstGeom>
+        </p:spPr>
+        <p:txBody>
+          <a:bodyPr vert="horz" lIns="91440" tIns="45720" rIns="91440" bIns="45720" rtlCol="0"/>
+          <a:lstStyle>
+            <a:lvl1pPr algn="r">
+              <a:defRPr sz="1200"/>
+            </a:lvl1pPr>
+          </a:lstStyle>
+          <a:p>
+            <a:fld id="{5D267360-6F79-4879-BF35-D526011DF202}" type="datetimeFigureOut">
+              <a:rPr lang="en-US" smtClean="0"/>
+              <a:t>4/7/2019</a:t>
+            </a:fld>
+            <a:endParaRPr lang="en-US"/>
+          </a:p>
+        </p:txBody>
+      </p:sp>
+      <p:sp>
+        <p:nvSpPr>
+          <p:cNvPr id="4" name="Espace réservé du pied de page 3">
+            <a:extLst>
+              <a:ext uri="{FF2B5EF4-FFF2-40B4-BE49-F238E27FC236}">
+                <a16:creationId xmlns:a16="http://schemas.microsoft.com/office/drawing/2014/main" id="{F2F55BD0-CEEF-4146-9F35-4EBB2E06A319}"/>
+              </a:ext>
+            </a:extLst>
+          </p:cNvPr>
+          <p:cNvSpPr>
+            <a:spLocks noGrp="1"/>
+          </p:cNvSpPr>
+          <p:nvPr>
+            <p:ph type="ftr" sz="quarter" idx="2"/>
+          </p:nvPr>
+        </p:nvSpPr>
+        <p:spPr>
+          <a:xfrm>
+            <a:off x="0" y="8685213"/>
+            <a:ext cx="2971800" cy="458787"/>
+          </a:xfrm>
+          <a:prstGeom prst="rect">
+            <a:avLst/>
+          </a:prstGeom>
+        </p:spPr>
+        <p:txBody>
+          <a:bodyPr vert="horz" lIns="91440" tIns="45720" rIns="91440" bIns="45720" rtlCol="0" anchor="b"/>
+          <a:lstStyle>
+            <a:lvl1pPr algn="l">
+              <a:defRPr sz="1200"/>
+            </a:lvl1pPr>
+          </a:lstStyle>
+          <a:p>
+            <a:r>
+              <a:rPr lang="en-US" dirty="0"/>
+              <a:t>Clement Truillet - Valentin Frydrychowski</a:t>
+            </a:r>
+          </a:p>
+        </p:txBody>
+      </p:sp>
+      <p:sp>
+        <p:nvSpPr>
+          <p:cNvPr id="5" name="Espace réservé du numéro de diapositive 4">
+            <a:extLst>
+              <a:ext uri="{FF2B5EF4-FFF2-40B4-BE49-F238E27FC236}">
+                <a16:creationId xmlns:a16="http://schemas.microsoft.com/office/drawing/2014/main" id="{658D23D8-C4C3-4041-AF07-EF8BB06A3CB0}"/>
+              </a:ext>
+            </a:extLst>
+          </p:cNvPr>
+          <p:cNvSpPr>
+            <a:spLocks noGrp="1"/>
+          </p:cNvSpPr>
+          <p:nvPr>
+            <p:ph type="sldNum" sz="quarter" idx="3"/>
+          </p:nvPr>
+        </p:nvSpPr>
+        <p:spPr>
+          <a:xfrm>
+            <a:off x="3884613" y="8685213"/>
+            <a:ext cx="2971800" cy="458787"/>
+          </a:xfrm>
+          <a:prstGeom prst="rect">
+            <a:avLst/>
+          </a:prstGeom>
+        </p:spPr>
+        <p:txBody>
+          <a:bodyPr vert="horz" lIns="91440" tIns="45720" rIns="91440" bIns="45720" rtlCol="0" anchor="b"/>
+          <a:lstStyle>
+            <a:lvl1pPr algn="r">
+              <a:defRPr sz="1200"/>
+            </a:lvl1pPr>
+          </a:lstStyle>
+          <a:p>
+            <a:fld id="{AB63EF5D-8AC8-4A16-87F5-3E2281CC9981}" type="slidenum">
+              <a:rPr lang="en-US" smtClean="0"/>
+              <a:t>‹N°›</a:t>
+            </a:fld>
+            <a:endParaRPr lang="en-US"/>
+          </a:p>
+        </p:txBody>
+      </p:sp>
+    </p:spTree>
+    <p:extLst>
+      <p:ext uri="{BB962C8B-B14F-4D97-AF65-F5344CB8AC3E}">
+        <p14:creationId xmlns:p14="http://schemas.microsoft.com/office/powerpoint/2010/main" val="3004612322"/>
+      </p:ext>
+    </p:extLst>
+  </p:cSld>
+  <p:clrMap bg1="lt1" tx1="dk1" bg2="lt2" tx2="dk2" accent1="accent1" accent2="accent2" accent3="accent3" accent4="accent4" accent5="accent5" accent6="accent6" hlink="hlink" folHlink="folHlink"/>
+  <p:hf hdr="0" dt="0"/>
+</p:handoutMaster>
+</file>
+
 <file path=ppt/notesMasters/notesMaster1.xml><?xml version="1.0" encoding="utf-8"?>
 <p:notesMaster xmlns:a="http://schemas.openxmlformats.org/drawingml/2006/main" xmlns:r="http://schemas.openxmlformats.org/officeDocument/2006/relationships" xmlns:p="http://schemas.openxmlformats.org/presentationml/2006/main">
   <p:cSld>
@@ -206,7 +402,7 @@
           <a:p>
             <a:fld id="{6AEF3AE6-1E1E-4912-8818-3CA2034E1B16}" type="datetimeFigureOut">
               <a:rPr lang="fr-FR" smtClean="0"/>
-              <a:t>04/04/2019</a:t>
+              <a:t>07/04/2019</a:t>
             </a:fld>
             <a:endParaRPr lang="fr-FR"/>
           </a:p>
@@ -331,7 +527,10 @@
             </a:lvl1pPr>
           </a:lstStyle>
           <a:p>
-            <a:endParaRPr lang="fr-FR"/>
+            <a:r>
+              <a:rPr lang="fr-FR"/>
+              <a:t>Clement Truillet - Valentin Frydrychowski</a:t>
+            </a:r>
           </a:p>
         </p:txBody>
       </p:sp>
@@ -378,6 +577,7 @@
     </p:extLst>
   </p:cSld>
   <p:clrMap bg1="lt1" tx1="dk1" bg2="lt2" tx2="dk2" accent1="accent1" accent2="accent2" accent3="accent3" accent4="accent4" accent5="accent5" accent6="accent6" hlink="hlink" folHlink="folHlink"/>
+  <p:hf hdr="0" dt="0"/>
   <p:notesStyle>
     <a:lvl1pPr marL="0" algn="l" defTabSz="914400" rtl="0" eaLnBrk="1" latinLnBrk="0" hangingPunct="1">
       <a:defRPr sz="1200" kern="1200">
@@ -544,6 +744,34 @@
           </a:p>
         </p:txBody>
       </p:sp>
+      <p:sp>
+        <p:nvSpPr>
+          <p:cNvPr id="5" name="Espace réservé du pied de page 4">
+            <a:extLst>
+              <a:ext uri="{FF2B5EF4-FFF2-40B4-BE49-F238E27FC236}">
+                <a16:creationId xmlns:a16="http://schemas.microsoft.com/office/drawing/2014/main" id="{5D5AD2C5-D320-4AA1-982F-C14DCB683961}"/>
+              </a:ext>
+            </a:extLst>
+          </p:cNvPr>
+          <p:cNvSpPr>
+            <a:spLocks noGrp="1"/>
+          </p:cNvSpPr>
+          <p:nvPr>
+            <p:ph type="ftr" sz="quarter" idx="4"/>
+          </p:nvPr>
+        </p:nvSpPr>
+        <p:spPr/>
+        <p:txBody>
+          <a:bodyPr/>
+          <a:lstStyle/>
+          <a:p>
+            <a:r>
+              <a:rPr lang="fr-FR"/>
+              <a:t>Clement Truillet - Valentin Frydrychowski</a:t>
+            </a:r>
+          </a:p>
+        </p:txBody>
+      </p:sp>
     </p:spTree>
     <p:extLst>
       <p:ext uri="{BB962C8B-B14F-4D97-AF65-F5344CB8AC3E}">
@@ -558,7 +786,7 @@
 </file>
 
 <file path=ppt/slideLayouts/slideLayout1.xml><?xml version="1.0" encoding="utf-8"?>
-<p:sldLayout xmlns:a="http://schemas.openxmlformats.org/drawingml/2006/main" xmlns:r="http://schemas.openxmlformats.org/officeDocument/2006/relationships" xmlns:p="http://schemas.openxmlformats.org/presentationml/2006/main" type="title" preserve="1">
+<p:sldLayout xmlns:a="http://schemas.openxmlformats.org/drawingml/2006/main" xmlns:r="http://schemas.openxmlformats.org/officeDocument/2006/relationships" xmlns:p="http://schemas.openxmlformats.org/presentationml/2006/main" preserve="1" userDrawn="1">
   <p:cSld name="Diapositive de titre">
     <p:spTree>
       <p:nvGrpSpPr>
@@ -574,37 +802,6 @@
           <a:chExt cx="0" cy="0"/>
         </a:xfrm>
       </p:grpSpPr>
-      <p:sp>
-        <p:nvSpPr>
-          <p:cNvPr id="2" name="Titre 1"/>
-          <p:cNvSpPr>
-            <a:spLocks noGrp="1"/>
-          </p:cNvSpPr>
-          <p:nvPr>
-            <p:ph type="ctrTitle"/>
-          </p:nvPr>
-        </p:nvSpPr>
-        <p:spPr>
-          <a:xfrm>
-            <a:off x="1524000" y="1122363"/>
-            <a:ext cx="9144000" cy="2387600"/>
-          </a:xfrm>
-        </p:spPr>
-        <p:txBody>
-          <a:bodyPr anchor="b"/>
-          <a:lstStyle>
-            <a:lvl1pPr algn="ctr">
-              <a:defRPr sz="6000"/>
-            </a:lvl1pPr>
-          </a:lstStyle>
-          <a:p>
-            <a:r>
-              <a:rPr lang="fr-FR" dirty="0"/>
-              <a:t>Modifiez le style du titre</a:t>
-            </a:r>
-          </a:p>
-        </p:txBody>
-      </p:sp>
       <p:sp>
         <p:nvSpPr>
           <p:cNvPr id="3" name="Sous-titre 2"/>
@@ -669,6 +866,69 @@
           </a:p>
         </p:txBody>
       </p:sp>
+      <p:sp>
+        <p:nvSpPr>
+          <p:cNvPr id="4" name="Espace réservé du numéro de diapositive 3">
+            <a:extLst>
+              <a:ext uri="{FF2B5EF4-FFF2-40B4-BE49-F238E27FC236}">
+                <a16:creationId xmlns:a16="http://schemas.microsoft.com/office/drawing/2014/main" id="{053FFC69-53B1-4018-9A39-D7EED8E1CFC2}"/>
+              </a:ext>
+            </a:extLst>
+          </p:cNvPr>
+          <p:cNvSpPr>
+            <a:spLocks noGrp="1"/>
+          </p:cNvSpPr>
+          <p:nvPr>
+            <p:ph type="sldNum" sz="quarter" idx="10"/>
+          </p:nvPr>
+        </p:nvSpPr>
+        <p:spPr/>
+        <p:txBody>
+          <a:bodyPr/>
+          <a:lstStyle/>
+          <a:p>
+            <a:r>
+              <a:rPr lang="fr-FR" dirty="0"/>
+              <a:t>  </a:t>
+            </a:r>
+            <a:fld id="{707B0EBA-5736-4F26-A1DB-FB95FEA04439}" type="slidenum">
+              <a:rPr lang="fr-FR" smtClean="0"/>
+              <a:pPr/>
+              <a:t>‹N°›</a:t>
+            </a:fld>
+            <a:endParaRPr lang="fr-FR" dirty="0"/>
+          </a:p>
+        </p:txBody>
+      </p:sp>
+      <p:sp>
+        <p:nvSpPr>
+          <p:cNvPr id="5" name="Titre 4">
+            <a:extLst>
+              <a:ext uri="{FF2B5EF4-FFF2-40B4-BE49-F238E27FC236}">
+                <a16:creationId xmlns:a16="http://schemas.microsoft.com/office/drawing/2014/main" id="{E4551D4D-147A-48A1-A0F5-58051FE5F884}"/>
+              </a:ext>
+            </a:extLst>
+          </p:cNvPr>
+          <p:cNvSpPr>
+            <a:spLocks noGrp="1"/>
+          </p:cNvSpPr>
+          <p:nvPr>
+            <p:ph type="title"/>
+          </p:nvPr>
+        </p:nvSpPr>
+        <p:spPr/>
+        <p:txBody>
+          <a:bodyPr/>
+          <a:lstStyle/>
+          <a:p>
+            <a:r>
+              <a:rPr lang="fr-FR"/>
+              <a:t>Modifiez le style du titre</a:t>
+            </a:r>
+            <a:endParaRPr lang="en-US"/>
+          </a:p>
+        </p:txBody>
+      </p:sp>
     </p:spTree>
     <p:extLst>
       <p:ext uri="{BB962C8B-B14F-4D97-AF65-F5344CB8AC3E}">
@@ -715,60 +975,92 @@
         <p:spPr/>
         <p:txBody>
           <a:bodyPr/>
-          <a:lstStyle/>
+          <a:lstStyle>
+            <a:lvl1pPr>
+              <a:defRPr>
+                <a:solidFill>
+                  <a:schemeClr val="tx1">
+                    <a:lumMod val="95000"/>
+                    <a:lumOff val="5000"/>
+                  </a:schemeClr>
+                </a:solidFill>
+              </a:defRPr>
+            </a:lvl1pPr>
+            <a:lvl2pPr>
+              <a:defRPr>
+                <a:solidFill>
+                  <a:schemeClr val="tx1">
+                    <a:lumMod val="95000"/>
+                    <a:lumOff val="5000"/>
+                  </a:schemeClr>
+                </a:solidFill>
+              </a:defRPr>
+            </a:lvl2pPr>
+            <a:lvl3pPr>
+              <a:defRPr>
+                <a:solidFill>
+                  <a:schemeClr val="tx1">
+                    <a:lumMod val="95000"/>
+                    <a:lumOff val="5000"/>
+                  </a:schemeClr>
+                </a:solidFill>
+              </a:defRPr>
+            </a:lvl3pPr>
+            <a:lvl4pPr>
+              <a:defRPr>
+                <a:solidFill>
+                  <a:schemeClr val="tx1">
+                    <a:lumMod val="95000"/>
+                    <a:lumOff val="5000"/>
+                  </a:schemeClr>
+                </a:solidFill>
+              </a:defRPr>
+            </a:lvl4pPr>
+            <a:lvl5pPr>
+              <a:defRPr>
+                <a:solidFill>
+                  <a:schemeClr val="tx1">
+                    <a:lumMod val="95000"/>
+                    <a:lumOff val="5000"/>
+                  </a:schemeClr>
+                </a:solidFill>
+              </a:defRPr>
+            </a:lvl5pPr>
+          </a:lstStyle>
           <a:p>
             <a:pPr lvl="0"/>
             <a:r>
-              <a:rPr lang="fr-FR"/>
+              <a:rPr lang="fr-FR" dirty="0"/>
               <a:t>Modifier les styles du texte du masque</a:t>
             </a:r>
           </a:p>
           <a:p>
             <a:pPr lvl="1"/>
             <a:r>
-              <a:rPr lang="fr-FR"/>
+              <a:rPr lang="fr-FR" dirty="0"/>
               <a:t>Deuxième niveau</a:t>
             </a:r>
           </a:p>
           <a:p>
             <a:pPr lvl="2"/>
             <a:r>
-              <a:rPr lang="fr-FR"/>
+              <a:rPr lang="fr-FR" dirty="0"/>
               <a:t>Troisième niveau</a:t>
             </a:r>
           </a:p>
           <a:p>
             <a:pPr lvl="3"/>
             <a:r>
-              <a:rPr lang="fr-FR"/>
+              <a:rPr lang="fr-FR" dirty="0"/>
               <a:t>Quatrième niveau</a:t>
             </a:r>
           </a:p>
           <a:p>
             <a:pPr lvl="4"/>
             <a:r>
-              <a:rPr lang="fr-FR"/>
+              <a:rPr lang="fr-FR" dirty="0"/>
               <a:t>Cinquième niveau</a:t>
             </a:r>
-          </a:p>
-        </p:txBody>
-      </p:sp>
-      <p:sp>
-        <p:nvSpPr>
-          <p:cNvPr id="7" name="Espace réservé du numéro de diapositive 6"/>
-          <p:cNvSpPr>
-            <a:spLocks noGrp="1"/>
-          </p:cNvSpPr>
-          <p:nvPr>
-            <p:ph type="sldNum" sz="quarter" idx="10"/>
-          </p:nvPr>
-        </p:nvSpPr>
-        <p:spPr/>
-        <p:txBody>
-          <a:bodyPr/>
-          <a:lstStyle/>
-          <a:p>
-            <a:endParaRPr lang="fr-FR" dirty="0"/>
           </a:p>
         </p:txBody>
       </p:sp>
@@ -785,12 +1077,62 @@
         <p:spPr/>
         <p:txBody>
           <a:bodyPr/>
+          <a:lstStyle>
+            <a:lvl1pPr>
+              <a:defRPr>
+                <a:solidFill>
+                  <a:schemeClr val="tx1">
+                    <a:lumMod val="95000"/>
+                    <a:lumOff val="5000"/>
+                  </a:schemeClr>
+                </a:solidFill>
+              </a:defRPr>
+            </a:lvl1pPr>
+          </a:lstStyle>
+          <a:p>
+            <a:r>
+              <a:rPr lang="fr-FR" dirty="0"/>
+              <a:t>Modifiez le style du titre</a:t>
+            </a:r>
+          </a:p>
+        </p:txBody>
+      </p:sp>
+      <p:sp>
+        <p:nvSpPr>
+          <p:cNvPr id="5" name="Espace réservé du numéro de diapositive 3">
+            <a:extLst>
+              <a:ext uri="{FF2B5EF4-FFF2-40B4-BE49-F238E27FC236}">
+                <a16:creationId xmlns:a16="http://schemas.microsoft.com/office/drawing/2014/main" id="{A6F08F96-B3C6-4CD7-8085-C69378A45FFC}"/>
+              </a:ext>
+            </a:extLst>
+          </p:cNvPr>
+          <p:cNvSpPr>
+            <a:spLocks noGrp="1"/>
+          </p:cNvSpPr>
+          <p:nvPr>
+            <p:ph type="sldNum" sz="quarter" idx="10"/>
+          </p:nvPr>
+        </p:nvSpPr>
+        <p:spPr>
+          <a:xfrm>
+            <a:off x="9448800" y="6492875"/>
+            <a:ext cx="2743200" cy="365125"/>
+          </a:xfrm>
+        </p:spPr>
+        <p:txBody>
+          <a:bodyPr/>
           <a:lstStyle/>
           <a:p>
             <a:r>
-              <a:rPr lang="fr-FR"/>
-              <a:t>Modifiez le style du titre</a:t>
-            </a:r>
+              <a:rPr lang="fr-FR" dirty="0"/>
+              <a:t>  </a:t>
+            </a:r>
+            <a:fld id="{707B0EBA-5736-4F26-A1DB-FB95FEA04439}" type="slidenum">
+              <a:rPr lang="fr-FR" smtClean="0"/>
+              <a:pPr/>
+              <a:t>‹N°›</a:t>
+            </a:fld>
+            <a:endParaRPr lang="fr-FR" dirty="0"/>
           </a:p>
         </p:txBody>
       </p:sp>
@@ -839,7 +1181,7 @@
         </p:nvSpPr>
         <p:spPr>
           <a:xfrm>
-            <a:off x="831850" y="1709738"/>
+            <a:off x="838200" y="1435418"/>
             <a:ext cx="10515600" cy="2852737"/>
           </a:xfrm>
         </p:spPr>
@@ -870,7 +1212,7 @@
         </p:nvSpPr>
         <p:spPr>
           <a:xfrm>
-            <a:off x="831850" y="4589463"/>
+            <a:off x="838200" y="4288155"/>
             <a:ext cx="10515600" cy="1500187"/>
           </a:xfrm>
         </p:spPr>
@@ -971,9 +1313,48 @@
           <a:p>
             <a:pPr lvl="0"/>
             <a:r>
-              <a:rPr lang="fr-FR"/>
+              <a:rPr lang="fr-FR" dirty="0"/>
               <a:t>Modifier les styles du texte du masque</a:t>
             </a:r>
+          </a:p>
+        </p:txBody>
+      </p:sp>
+      <p:sp>
+        <p:nvSpPr>
+          <p:cNvPr id="4" name="Espace réservé du numéro de diapositive 3">
+            <a:extLst>
+              <a:ext uri="{FF2B5EF4-FFF2-40B4-BE49-F238E27FC236}">
+                <a16:creationId xmlns:a16="http://schemas.microsoft.com/office/drawing/2014/main" id="{A637539B-4317-4E5E-94F4-48E46250FD03}"/>
+              </a:ext>
+            </a:extLst>
+          </p:cNvPr>
+          <p:cNvSpPr>
+            <a:spLocks noGrp="1"/>
+          </p:cNvSpPr>
+          <p:nvPr>
+            <p:ph type="sldNum" sz="quarter" idx="10"/>
+          </p:nvPr>
+        </p:nvSpPr>
+        <p:spPr>
+          <a:xfrm>
+            <a:off x="9448800" y="6492875"/>
+            <a:ext cx="2743200" cy="365125"/>
+          </a:xfrm>
+        </p:spPr>
+        <p:txBody>
+          <a:bodyPr/>
+          <a:lstStyle/>
+          <a:p>
+            <a:r>
+              <a:rPr lang="fr-FR" dirty="0"/>
+              <a:t>  </a:t>
+            </a:r>
+            <a:fld id="{707B0EBA-5736-4F26-A1DB-FB95FEA04439}" type="slidenum">
+              <a:rPr lang="fr-FR" smtClean="0"/>
+              <a:pPr/>
+              <a:t>‹N°›</a:t>
+            </a:fld>
+            <a:endParaRPr lang="fr-FR" dirty="0"/>
           </a:p>
         </p:txBody>
       </p:sp>
@@ -1032,6 +1413,45 @@
           </a:p>
         </p:txBody>
       </p:sp>
+      <p:sp>
+        <p:nvSpPr>
+          <p:cNvPr id="3" name="Espace réservé du numéro de diapositive 3">
+            <a:extLst>
+              <a:ext uri="{FF2B5EF4-FFF2-40B4-BE49-F238E27FC236}">
+                <a16:creationId xmlns:a16="http://schemas.microsoft.com/office/drawing/2014/main" id="{791826A6-5FDB-4A09-9534-B125A0F1D914}"/>
+              </a:ext>
+            </a:extLst>
+          </p:cNvPr>
+          <p:cNvSpPr>
+            <a:spLocks noGrp="1"/>
+          </p:cNvSpPr>
+          <p:nvPr>
+            <p:ph type="sldNum" sz="quarter" idx="10"/>
+          </p:nvPr>
+        </p:nvSpPr>
+        <p:spPr>
+          <a:xfrm>
+            <a:off x="9448800" y="6492875"/>
+            <a:ext cx="2743200" cy="365125"/>
+          </a:xfrm>
+        </p:spPr>
+        <p:txBody>
+          <a:bodyPr/>
+          <a:lstStyle/>
+          <a:p>
+            <a:r>
+              <a:rPr lang="fr-FR" dirty="0"/>
+              <a:t>  </a:t>
+            </a:r>
+            <a:fld id="{707B0EBA-5736-4F26-A1DB-FB95FEA04439}" type="slidenum">
+              <a:rPr lang="fr-FR" smtClean="0"/>
+              <a:pPr/>
+              <a:t>‹N°›</a:t>
+            </a:fld>
+            <a:endParaRPr lang="fr-FR" dirty="0"/>
+          </a:p>
+        </p:txBody>
+      </p:sp>
     </p:spTree>
     <p:extLst>
       <p:ext uri="{BB962C8B-B14F-4D97-AF65-F5344CB8AC3E}">
@@ -1059,7 +1479,7 @@
           </a:blip>
           <a:srcRect/>
           <a:stretch>
-            <a:fillRect/>
+            <a:fillRect t="-22000"/>
           </a:stretch>
         </a:blipFill>
         <a:effectLst/>
@@ -1124,7 +1544,7 @@
         <p:spPr>
           <a:xfrm>
             <a:off x="838200" y="1825625"/>
-            <a:ext cx="10515600" cy="4351338"/>
+            <a:ext cx="10515600" cy="3521627"/>
           </a:xfrm>
           <a:prstGeom prst="rect">
             <a:avLst/>
@@ -1184,7 +1604,7 @@
         </p:nvSpPr>
         <p:spPr>
           <a:xfrm>
-            <a:off x="8610600" y="6356350"/>
+            <a:off x="9448800" y="6492875"/>
             <a:ext cx="2743200" cy="365125"/>
           </a:xfrm>
           <a:prstGeom prst="rect">
@@ -1204,10 +1624,6 @@
             </a:lvl1pPr>
           </a:lstStyle>
           <a:p>
-            <a:r>
-              <a:rPr lang="fr-FR" dirty="0"/>
-              <a:t> Slide </a:t>
-            </a:r>
             <a:fld id="{707B0EBA-5736-4F26-A1DB-FB95FEA04439}" type="slidenum">
               <a:rPr lang="fr-FR" smtClean="0"/>
               <a:pPr/>
@@ -1217,6 +1633,84 @@
           </a:p>
         </p:txBody>
       </p:sp>
+      <p:sp>
+        <p:nvSpPr>
+          <p:cNvPr id="4" name="ZoneTexte 3">
+            <a:extLst>
+              <a:ext uri="{FF2B5EF4-FFF2-40B4-BE49-F238E27FC236}">
+                <a16:creationId xmlns:a16="http://schemas.microsoft.com/office/drawing/2014/main" id="{840CDAE9-3D79-4FEA-8FE2-95786457DE2E}"/>
+              </a:ext>
+            </a:extLst>
+          </p:cNvPr>
+          <p:cNvSpPr txBox="1"/>
+          <p:nvPr userDrawn="1"/>
+        </p:nvSpPr>
+        <p:spPr>
+          <a:xfrm>
+            <a:off x="3921760" y="6306105"/>
+            <a:ext cx="4348480" cy="369332"/>
+          </a:xfrm>
+          <a:prstGeom prst="rect">
+            <a:avLst/>
+          </a:prstGeom>
+          <a:noFill/>
+        </p:spPr>
+        <p:txBody>
+          <a:bodyPr wrap="square" rtlCol="0">
+            <a:spAutoFit/>
+          </a:bodyPr>
+          <a:lstStyle/>
+          <a:p>
+            <a:pPr algn="ctr"/>
+            <a:r>
+              <a:rPr lang="en-US" b="1" dirty="0">
+                <a:solidFill>
+                  <a:schemeClr val="bg1">
+                    <a:lumMod val="95000"/>
+                  </a:schemeClr>
+                </a:solidFill>
+              </a:rPr>
+              <a:t>Clément Truillet – Valentin Frydrychowski</a:t>
+            </a:r>
+          </a:p>
+        </p:txBody>
+      </p:sp>
+      <p:pic>
+        <p:nvPicPr>
+          <p:cNvPr id="7" name="Image 6">
+            <a:extLst>
+              <a:ext uri="{FF2B5EF4-FFF2-40B4-BE49-F238E27FC236}">
+                <a16:creationId xmlns:a16="http://schemas.microsoft.com/office/drawing/2014/main" id="{F5D68B4D-DA7B-4CC5-9E65-2EB4DDF5DA73}"/>
+              </a:ext>
+            </a:extLst>
+          </p:cNvPr>
+          <p:cNvPicPr>
+            <a:picLocks noChangeAspect="1"/>
+          </p:cNvPicPr>
+          <p:nvPr userDrawn="1"/>
+        </p:nvPicPr>
+        <p:blipFill>
+          <a:blip r:embed="rId7">
+            <a:extLst>
+              <a:ext uri="{28A0092B-C50C-407E-A947-70E740481C1C}">
+                <a14:useLocalDpi xmlns:a14="http://schemas.microsoft.com/office/drawing/2010/main" val="0"/>
+              </a:ext>
+            </a:extLst>
+          </a:blip>
+          <a:stretch>
+            <a:fillRect/>
+          </a:stretch>
+        </p:blipFill>
+        <p:spPr>
+          <a:xfrm>
+            <a:off x="9547784" y="165911"/>
+            <a:ext cx="2545232" cy="700861"/>
+          </a:xfrm>
+          <a:prstGeom prst="rect">
+            <a:avLst/>
+          </a:prstGeom>
+        </p:spPr>
+      </p:pic>
     </p:spTree>
     <p:extLst>
       <p:ext uri="{BB962C8B-B14F-4D97-AF65-F5344CB8AC3E}">
@@ -1234,6 +1728,7 @@
   <p:transition spd="slow">
     <p:wipe dir="r"/>
   </p:transition>
+  <p:hf sldNum="0" hdr="0" dt="0"/>
   <p:txStyles>
     <p:titleStyle>
       <a:lvl1pPr algn="l" defTabSz="914400" rtl="0" eaLnBrk="1" latinLnBrk="0" hangingPunct="1">
@@ -1246,7 +1741,10 @@
         <a:buNone/>
         <a:defRPr sz="4400" kern="1200">
           <a:solidFill>
-            <a:schemeClr val="bg1"/>
+            <a:schemeClr val="tx1">
+              <a:lumMod val="95000"/>
+              <a:lumOff val="5000"/>
+            </a:schemeClr>
           </a:solidFill>
           <a:latin typeface="Tw Cen MT Condensed" panose="020B0606020104020203" pitchFamily="34" charset="0"/>
           <a:ea typeface="+mj-ea"/>
@@ -1264,11 +1762,14 @@
         </a:spcBef>
         <a:buFontTx/>
         <a:buBlip>
-          <a:blip r:embed="rId7"/>
+          <a:blip r:embed="rId8"/>
         </a:buBlip>
         <a:defRPr sz="2800" kern="1200">
           <a:solidFill>
-            <a:schemeClr val="bg1"/>
+            <a:schemeClr val="tx1">
+              <a:lumMod val="95000"/>
+              <a:lumOff val="5000"/>
+            </a:schemeClr>
           </a:solidFill>
           <a:latin typeface="Tw Cen MT" panose="020B0602020104020603" pitchFamily="34" charset="0"/>
           <a:ea typeface="+mn-ea"/>
@@ -1284,11 +1785,14 @@
         </a:spcBef>
         <a:buFontTx/>
         <a:buBlip>
-          <a:blip r:embed="rId8"/>
+          <a:blip r:embed="rId9"/>
         </a:buBlip>
         <a:defRPr sz="2400" kern="1200">
           <a:solidFill>
-            <a:schemeClr val="bg1"/>
+            <a:schemeClr val="tx1">
+              <a:lumMod val="95000"/>
+              <a:lumOff val="5000"/>
+            </a:schemeClr>
           </a:solidFill>
           <a:latin typeface="Tw Cen MT" panose="020B0602020104020603" pitchFamily="34" charset="0"/>
           <a:ea typeface="+mn-ea"/>
@@ -1306,7 +1810,10 @@
         <a:buChar char="•"/>
         <a:defRPr sz="2000" kern="1200">
           <a:solidFill>
-            <a:schemeClr val="bg1"/>
+            <a:schemeClr val="tx1">
+              <a:lumMod val="95000"/>
+              <a:lumOff val="5000"/>
+            </a:schemeClr>
           </a:solidFill>
           <a:latin typeface="Tw Cen MT" panose="020B0602020104020603" pitchFamily="34" charset="0"/>
           <a:ea typeface="+mn-ea"/>
@@ -1324,7 +1831,10 @@
         <a:buChar char="•"/>
         <a:defRPr sz="1800" kern="1200">
           <a:solidFill>
-            <a:schemeClr val="bg1"/>
+            <a:schemeClr val="tx1">
+              <a:lumMod val="95000"/>
+              <a:lumOff val="5000"/>
+            </a:schemeClr>
           </a:solidFill>
           <a:latin typeface="Tw Cen MT" panose="020B0602020104020603" pitchFamily="34" charset="0"/>
           <a:ea typeface="+mn-ea"/>
@@ -1342,7 +1852,10 @@
         <a:buChar char="•"/>
         <a:defRPr sz="1800" kern="1200">
           <a:solidFill>
-            <a:schemeClr val="bg1"/>
+            <a:schemeClr val="tx1">
+              <a:lumMod val="95000"/>
+              <a:lumOff val="5000"/>
+            </a:schemeClr>
           </a:solidFill>
           <a:latin typeface="Tw Cen MT" panose="020B0602020104020603" pitchFamily="34" charset="0"/>
           <a:ea typeface="+mn-ea"/>
@@ -1548,55 +2061,38 @@
             <p:ph type="ctrTitle"/>
           </p:nvPr>
         </p:nvSpPr>
-        <p:spPr/>
-        <p:txBody>
-          <a:bodyPr/>
+        <p:spPr>
+          <a:xfrm>
+            <a:off x="1524000" y="1750059"/>
+            <a:ext cx="9144000" cy="1864043"/>
+          </a:xfrm>
+        </p:spPr>
+        <p:txBody>
+          <a:bodyPr>
+            <a:normAutofit fontScale="90000"/>
+          </a:bodyPr>
           <a:lstStyle/>
           <a:p>
-            <a:r>
-              <a:rPr lang="fr-FR" dirty="0"/>
+            <a:pPr algn="ctr"/>
+            <a:r>
+              <a:rPr lang="fr-FR" sz="6700" dirty="0"/>
               <a:t>On en a Gros (sur le compte)</a:t>
             </a:r>
             <a:br>
-              <a:rPr lang="fr-FR" dirty="0"/>
+              <a:rPr lang="fr-FR" sz="6700" dirty="0"/>
             </a:br>
             <a:r>
-              <a:rPr lang="fr-FR" dirty="0"/>
+              <a:rPr lang="fr-FR" sz="4000" dirty="0"/>
+              <a:t>L2 CUPGE</a:t>
+            </a:r>
+            <a:br>
+              <a:rPr lang="fr-FR" sz="4000" dirty="0"/>
+            </a:br>
+            <a:r>
+              <a:rPr lang="fr-FR" sz="3600" dirty="0"/>
               <a:t>2019</a:t>
             </a:r>
-          </a:p>
-        </p:txBody>
-      </p:sp>
-      <p:sp>
-        <p:nvSpPr>
-          <p:cNvPr id="3" name="Sous-titre 2"/>
-          <p:cNvSpPr>
-            <a:spLocks noGrp="1"/>
-          </p:cNvSpPr>
-          <p:nvPr>
-            <p:ph type="subTitle" idx="1"/>
-          </p:nvPr>
-        </p:nvSpPr>
-        <p:spPr/>
-        <p:txBody>
-          <a:bodyPr/>
-          <a:lstStyle/>
-          <a:p>
-            <a:r>
-              <a:rPr lang="fr-FR" dirty="0"/>
-              <a:t>Clément TRUILLET – Valentin </a:t>
-            </a:r>
-            <a:r>
-              <a:rPr lang="fr-FR" dirty="0" err="1"/>
-              <a:t>Frydrychowki</a:t>
-            </a:r>
-            <a:endParaRPr lang="fr-FR" dirty="0"/>
-          </a:p>
-          <a:p>
-            <a:r>
-              <a:rPr lang="fr-FR" dirty="0"/>
-              <a:t>L2 CUPGE</a:t>
-            </a:r>
+            <a:endParaRPr lang="fr-FR" sz="4800" dirty="0"/>
           </a:p>
         </p:txBody>
       </p:sp>
@@ -1903,13 +2399,13 @@
   <p:clrMapOvr>
     <a:masterClrMapping/>
   </p:clrMapOvr>
-  <mc:AlternateContent xmlns:mc="http://schemas.openxmlformats.org/markup-compatibility/2006">
-    <mc:Choice xmlns:p14="http://schemas.microsoft.com/office/powerpoint/2010/main" Requires="p14">
+  <mc:AlternateContent xmlns:mc="http://schemas.openxmlformats.org/markup-compatibility/2006" xmlns:p14="http://schemas.microsoft.com/office/powerpoint/2010/main">
+    <mc:Choice Requires="p14">
       <p:transition spd="slow" p14:dur="3900">
         <p14:glitter pattern="hexagon"/>
       </p:transition>
     </mc:Choice>
-    <mc:Fallback>
+    <mc:Fallback xmlns="">
       <p:transition spd="slow">
         <p:fade/>
       </p:transition>
@@ -1956,7 +2452,14 @@
           <a:lstStyle/>
           <a:p>
             <a:r>
-              <a:rPr lang="fr-FR" dirty="0"/>
+              <a:rPr lang="fr-FR" dirty="0">
+                <a:solidFill>
+                  <a:schemeClr val="tx1">
+                    <a:lumMod val="95000"/>
+                    <a:lumOff val="5000"/>
+                  </a:schemeClr>
+                </a:solidFill>
+              </a:rPr>
               <a:t>Outils utilisés</a:t>
             </a:r>
             <a:br>
@@ -1981,56 +2484,128 @@
           <a:bodyPr/>
           <a:lstStyle/>
           <a:p>
-            <a:r>
-              <a:rPr lang="fr-FR" dirty="0"/>
+            <a:pPr>
+              <a:buBlip>
+                <a:blip r:embed="rId2"/>
+              </a:buBlip>
+            </a:pPr>
+            <a:r>
+              <a:rPr lang="fr-FR" dirty="0">
+                <a:solidFill>
+                  <a:schemeClr val="tx1">
+                    <a:lumMod val="85000"/>
+                    <a:lumOff val="15000"/>
+                  </a:schemeClr>
+                </a:solidFill>
+              </a:rPr>
               <a:t>Visual Studio Code </a:t>
             </a:r>
           </a:p>
           <a:p>
             <a:pPr lvl="1"/>
             <a:r>
-              <a:rPr lang="fr-FR" dirty="0"/>
+              <a:rPr lang="fr-FR" dirty="0">
+                <a:solidFill>
+                  <a:schemeClr val="tx1">
+                    <a:lumMod val="85000"/>
+                    <a:lumOff val="15000"/>
+                  </a:schemeClr>
+                </a:solidFill>
+              </a:rPr>
               <a:t> Programmation</a:t>
             </a:r>
           </a:p>
           <a:p>
+            <a:pPr lvl="1">
+              <a:buBlip>
+                <a:blip r:embed="rId2"/>
+              </a:buBlip>
+            </a:pPr>
+            <a:r>
+              <a:rPr lang="fr-FR" dirty="0">
+                <a:solidFill>
+                  <a:schemeClr val="tx1">
+                    <a:lumMod val="85000"/>
+                    <a:lumOff val="15000"/>
+                  </a:schemeClr>
+                </a:solidFill>
+              </a:rPr>
+              <a:t> Terminal (Bash Ubuntu) intégré</a:t>
+            </a:r>
+            <a:endParaRPr lang="fr-FR" i="1" dirty="0">
+              <a:solidFill>
+                <a:schemeClr val="tx1">
+                  <a:lumMod val="85000"/>
+                  <a:lumOff val="15000"/>
+                </a:schemeClr>
+              </a:solidFill>
+            </a:endParaRPr>
+          </a:p>
+          <a:p>
+            <a:r>
+              <a:rPr lang="fr-FR" dirty="0">
+                <a:solidFill>
+                  <a:schemeClr val="tx1">
+                    <a:lumMod val="85000"/>
+                    <a:lumOff val="15000"/>
+                  </a:schemeClr>
+                </a:solidFill>
+              </a:rPr>
+              <a:t>Bash Ubuntu pour Windows 10</a:t>
+            </a:r>
+          </a:p>
+          <a:p>
             <a:pPr lvl="1"/>
             <a:r>
-              <a:rPr lang="fr-FR" dirty="0"/>
-              <a:t> Terminal (Bash Ubuntu) intégré</a:t>
-            </a:r>
-            <a:endParaRPr lang="fr-FR" i="1" dirty="0"/>
-          </a:p>
-          <a:p>
-            <a:r>
-              <a:rPr lang="fr-FR" dirty="0"/>
-              <a:t>Bash Ubuntu pour Windows 10</a:t>
+              <a:rPr lang="fr-FR" dirty="0">
+                <a:solidFill>
+                  <a:schemeClr val="tx1">
+                    <a:lumMod val="85000"/>
+                    <a:lumOff val="15000"/>
+                  </a:schemeClr>
+                </a:solidFill>
+              </a:rPr>
+              <a:t> Exécuter et compiler sous linux</a:t>
+            </a:r>
+          </a:p>
+          <a:p>
+            <a:r>
+              <a:rPr lang="fr-FR" dirty="0">
+                <a:solidFill>
+                  <a:schemeClr val="tx1">
+                    <a:lumMod val="85000"/>
+                    <a:lumOff val="15000"/>
+                  </a:schemeClr>
+                </a:solidFill>
+              </a:rPr>
+              <a:t>GitHub</a:t>
             </a:r>
           </a:p>
           <a:p>
             <a:pPr lvl="1"/>
             <a:r>
-              <a:rPr lang="fr-FR" dirty="0"/>
-              <a:t> Exécuter et compiler sous linux</a:t>
-            </a:r>
-          </a:p>
-          <a:p>
-            <a:r>
-              <a:rPr lang="fr-FR" dirty="0"/>
-              <a:t>GitHub</a:t>
+              <a:rPr lang="fr-FR" dirty="0">
+                <a:solidFill>
+                  <a:schemeClr val="tx1">
+                    <a:lumMod val="85000"/>
+                    <a:lumOff val="15000"/>
+                  </a:schemeClr>
+                </a:solidFill>
+              </a:rPr>
+              <a:t> Travailler à plusieurs</a:t>
             </a:r>
           </a:p>
           <a:p>
             <a:pPr lvl="1"/>
             <a:r>
-              <a:rPr lang="fr-FR" dirty="0"/>
-              <a:t> Travailler à plusieurs</a:t>
-            </a:r>
-          </a:p>
-          <a:p>
-            <a:pPr lvl="1"/>
-            <a:r>
-              <a:rPr lang="fr-FR" dirty="0"/>
+              <a:rPr lang="fr-FR" dirty="0">
+                <a:solidFill>
+                  <a:schemeClr val="tx1">
+                    <a:lumMod val="85000"/>
+                    <a:lumOff val="15000"/>
+                  </a:schemeClr>
+                </a:solidFill>
+              </a:rPr>
               <a:t> Gérer les versions</a:t>
             </a:r>
           </a:p>
@@ -2085,7 +2660,7 @@
           <p:nvPr/>
         </p:nvPicPr>
         <p:blipFill>
-          <a:blip r:embed="rId2">
+          <a:blip r:embed="rId3">
             <a:extLst>
               <a:ext uri="{28A0092B-C50C-407E-A947-70E740481C1C}">
                 <a14:useLocalDpi xmlns:a14="http://schemas.microsoft.com/office/drawing/2010/main" val="0"/>
@@ -2132,7 +2707,7 @@
           <p:nvPr/>
         </p:nvPicPr>
         <p:blipFill>
-          <a:blip r:embed="rId3">
+          <a:blip r:embed="rId4">
             <a:extLst>
               <a:ext uri="{28A0092B-C50C-407E-A947-70E740481C1C}">
                 <a14:useLocalDpi xmlns:a14="http://schemas.microsoft.com/office/drawing/2010/main" val="0"/>
@@ -2179,7 +2754,7 @@
           <p:nvPr/>
         </p:nvPicPr>
         <p:blipFill>
-          <a:blip r:embed="rId4">
+          <a:blip r:embed="rId5">
             <a:extLst>
               <a:ext uri="{28A0092B-C50C-407E-A947-70E740481C1C}">
                 <a14:useLocalDpi xmlns:a14="http://schemas.microsoft.com/office/drawing/2010/main" val="0"/>
@@ -4019,4 +4594,299 @@
     </a:ext>
   </a:extLst>
 </a:theme>
+</file>
+
+<file path=ppt/theme/theme3.xml><?xml version="1.0" encoding="utf-8"?>
+<a:theme xmlns:a="http://schemas.openxmlformats.org/drawingml/2006/main" name="Thème Office">
+  <a:themeElements>
+    <a:clrScheme name="Office">
+      <a:dk1>
+        <a:sysClr val="windowText" lastClr="000000"/>
+      </a:dk1>
+      <a:lt1>
+        <a:sysClr val="window" lastClr="FFFFFF"/>
+      </a:lt1>
+      <a:dk2>
+        <a:srgbClr val="44546A"/>
+      </a:dk2>
+      <a:lt2>
+        <a:srgbClr val="E7E6E6"/>
+      </a:lt2>
+      <a:accent1>
+        <a:srgbClr val="4472C4"/>
+      </a:accent1>
+      <a:accent2>
+        <a:srgbClr val="ED7D31"/>
+      </a:accent2>
+      <a:accent3>
+        <a:srgbClr val="A5A5A5"/>
+      </a:accent3>
+      <a:accent4>
+        <a:srgbClr val="FFC000"/>
+      </a:accent4>
+      <a:accent5>
+        <a:srgbClr val="5B9BD5"/>
+      </a:accent5>
+      <a:accent6>
+        <a:srgbClr val="70AD47"/>
+      </a:accent6>
+      <a:hlink>
+        <a:srgbClr val="0563C1"/>
+      </a:hlink>
+      <a:folHlink>
+        <a:srgbClr val="954F72"/>
+      </a:folHlink>
+    </a:clrScheme>
+    <a:fontScheme name="Office">
+      <a:majorFont>
+        <a:latin typeface="Calibri Light" panose="020F0302020204030204"/>
+        <a:ea typeface=""/>
+        <a:cs typeface=""/>
+        <a:font script="Jpan" typeface="游ゴシック Light"/>
+        <a:font script="Hang" typeface="맑은 고딕"/>
+        <a:font script="Hans" typeface="等线 Light"/>
+        <a:font script="Hant" typeface="新細明體"/>
+        <a:font script="Arab" typeface="Times New Roman"/>
+        <a:font script="Hebr" typeface="Times New Roman"/>
+        <a:font script="Thai" typeface="Angsana New"/>
+        <a:font script="Ethi" typeface="Nyala"/>
+        <a:font script="Beng" typeface="Vrinda"/>
+        <a:font script="Gujr" typeface="Shruti"/>
+        <a:font script="Khmr" typeface="MoolBoran"/>
+        <a:font script="Knda" typeface="Tunga"/>
+        <a:font script="Guru" typeface="Raavi"/>
+        <a:font script="Cans" typeface="Euphemia"/>
+        <a:font script="Cher" typeface="Plantagenet Cherokee"/>
+        <a:font script="Yiii" typeface="Microsoft Yi Baiti"/>
+        <a:font script="Tibt" typeface="Microsoft Himalaya"/>
+        <a:font script="Thaa" typeface="MV Boli"/>
+        <a:font script="Deva" typeface="Mangal"/>
+        <a:font script="Telu" typeface="Gautami"/>
+        <a:font script="Taml" typeface="Latha"/>
+        <a:font script="Syrc" typeface="Estrangelo Edessa"/>
+        <a:font script="Orya" typeface="Kalinga"/>
+        <a:font script="Mlym" typeface="Kartika"/>
+        <a:font script="Laoo" typeface="DokChampa"/>
+        <a:font script="Sinh" typeface="Iskoola Pota"/>
+        <a:font script="Mong" typeface="Mongolian Baiti"/>
+        <a:font script="Viet" typeface="Times New Roman"/>
+        <a:font script="Uigh" typeface="Microsoft Uighur"/>
+        <a:font script="Geor" typeface="Sylfaen"/>
+        <a:font script="Armn" typeface="Arial"/>
+        <a:font script="Bugi" typeface="Leelawadee UI"/>
+        <a:font script="Bopo" typeface="Microsoft JhengHei"/>
+        <a:font script="Java" typeface="Javanese Text"/>
+        <a:font script="Lisu" typeface="Segoe UI"/>
+        <a:font script="Mymr" typeface="Myanmar Text"/>
+        <a:font script="Nkoo" typeface="Ebrima"/>
+        <a:font script="Olck" typeface="Nirmala UI"/>
+        <a:font script="Osma" typeface="Ebrima"/>
+        <a:font script="Phag" typeface="Phagspa"/>
+        <a:font script="Syrn" typeface="Estrangelo Edessa"/>
+        <a:font script="Syrj" typeface="Estrangelo Edessa"/>
+        <a:font script="Syre" typeface="Estrangelo Edessa"/>
+        <a:font script="Sora" typeface="Nirmala UI"/>
+        <a:font script="Tale" typeface="Microsoft Tai Le"/>
+        <a:font script="Talu" typeface="Microsoft New Tai Lue"/>
+        <a:font script="Tfng" typeface="Ebrima"/>
+      </a:majorFont>
+      <a:minorFont>
+        <a:latin typeface="Calibri" panose="020F0502020204030204"/>
+        <a:ea typeface=""/>
+        <a:cs typeface=""/>
+        <a:font script="Jpan" typeface="游ゴシック"/>
+        <a:font script="Hang" typeface="맑은 고딕"/>
+        <a:font script="Hans" typeface="等线"/>
+        <a:font script="Hant" typeface="新細明體"/>
+        <a:font script="Arab" typeface="Arial"/>
+        <a:font script="Hebr" typeface="Arial"/>
+        <a:font script="Thai" typeface="Cordia New"/>
+        <a:font script="Ethi" typeface="Nyala"/>
+        <a:font script="Beng" typeface="Vrinda"/>
+        <a:font script="Gujr" typeface="Shruti"/>
+        <a:font script="Khmr" typeface="DaunPenh"/>
+        <a:font script="Knda" typeface="Tunga"/>
+        <a:font script="Guru" typeface="Raavi"/>
+        <a:font script="Cans" typeface="Euphemia"/>
+        <a:font script="Cher" typeface="Plantagenet Cherokee"/>
+        <a:font script="Yiii" typeface="Microsoft Yi Baiti"/>
+        <a:font script="Tibt" typeface="Microsoft Himalaya"/>
+        <a:font script="Thaa" typeface="MV Boli"/>
+        <a:font script="Deva" typeface="Mangal"/>
+        <a:font script="Telu" typeface="Gautami"/>
+        <a:font script="Taml" typeface="Latha"/>
+        <a:font script="Syrc" typeface="Estrangelo Edessa"/>
+        <a:font script="Orya" typeface="Kalinga"/>
+        <a:font script="Mlym" typeface="Kartika"/>
+        <a:font script="Laoo" typeface="DokChampa"/>
+        <a:font script="Sinh" typeface="Iskoola Pota"/>
+        <a:font script="Mong" typeface="Mongolian Baiti"/>
+        <a:font script="Viet" typeface="Arial"/>
+        <a:font script="Uigh" typeface="Microsoft Uighur"/>
+        <a:font script="Geor" typeface="Sylfaen"/>
+        <a:font script="Armn" typeface="Arial"/>
+        <a:font script="Bugi" typeface="Leelawadee UI"/>
+        <a:font script="Bopo" typeface="Microsoft JhengHei"/>
+        <a:font script="Java" typeface="Javanese Text"/>
+        <a:font script="Lisu" typeface="Segoe UI"/>
+        <a:font script="Mymr" typeface="Myanmar Text"/>
+        <a:font script="Nkoo" typeface="Ebrima"/>
+        <a:font script="Olck" typeface="Nirmala UI"/>
+        <a:font script="Osma" typeface="Ebrima"/>
+        <a:font script="Phag" typeface="Phagspa"/>
+        <a:font script="Syrn" typeface="Estrangelo Edessa"/>
+        <a:font script="Syrj" typeface="Estrangelo Edessa"/>
+        <a:font script="Syre" typeface="Estrangelo Edessa"/>
+        <a:font script="Sora" typeface="Nirmala UI"/>
+        <a:font script="Tale" typeface="Microsoft Tai Le"/>
+        <a:font script="Talu" typeface="Microsoft New Tai Lue"/>
+        <a:font script="Tfng" typeface="Ebrima"/>
+      </a:minorFont>
+    </a:fontScheme>
+    <a:fmtScheme name="Office">
+      <a:fillStyleLst>
+        <a:solidFill>
+          <a:schemeClr val="phClr"/>
+        </a:solidFill>
+        <a:gradFill rotWithShape="1">
+          <a:gsLst>
+            <a:gs pos="0">
+              <a:schemeClr val="phClr">
+                <a:lumMod val="110000"/>
+                <a:satMod val="105000"/>
+                <a:tint val="67000"/>
+              </a:schemeClr>
+            </a:gs>
+            <a:gs pos="50000">
+              <a:schemeClr val="phClr">
+                <a:lumMod val="105000"/>
+                <a:satMod val="103000"/>
+                <a:tint val="73000"/>
+              </a:schemeClr>
+            </a:gs>
+            <a:gs pos="100000">
+              <a:schemeClr val="phClr">
+                <a:lumMod val="105000"/>
+                <a:satMod val="109000"/>
+                <a:tint val="81000"/>
+              </a:schemeClr>
+            </a:gs>
+          </a:gsLst>
+          <a:lin ang="5400000" scaled="0"/>
+        </a:gradFill>
+        <a:gradFill rotWithShape="1">
+          <a:gsLst>
+            <a:gs pos="0">
+              <a:schemeClr val="phClr">
+                <a:satMod val="103000"/>
+                <a:lumMod val="102000"/>
+                <a:tint val="94000"/>
+              </a:schemeClr>
+            </a:gs>
+            <a:gs pos="50000">
+              <a:schemeClr val="phClr">
+                <a:satMod val="110000"/>
+                <a:lumMod val="100000"/>
+                <a:shade val="100000"/>
+              </a:schemeClr>
+            </a:gs>
+            <a:gs pos="100000">
+              <a:schemeClr val="phClr">
+                <a:lumMod val="99000"/>
+                <a:satMod val="120000"/>
+                <a:shade val="78000"/>
+              </a:schemeClr>
+            </a:gs>
+          </a:gsLst>
+          <a:lin ang="5400000" scaled="0"/>
+        </a:gradFill>
+      </a:fillStyleLst>
+      <a:lnStyleLst>
+        <a:ln w="6350" cap="flat" cmpd="sng" algn="ctr">
+          <a:solidFill>
+            <a:schemeClr val="phClr"/>
+          </a:solidFill>
+          <a:prstDash val="solid"/>
+          <a:miter lim="800000"/>
+        </a:ln>
+        <a:ln w="12700" cap="flat" cmpd="sng" algn="ctr">
+          <a:solidFill>
+            <a:schemeClr val="phClr"/>
+          </a:solidFill>
+          <a:prstDash val="solid"/>
+          <a:miter lim="800000"/>
+        </a:ln>
+        <a:ln w="19050" cap="flat" cmpd="sng" algn="ctr">
+          <a:solidFill>
+            <a:schemeClr val="phClr"/>
+          </a:solidFill>
+          <a:prstDash val="solid"/>
+          <a:miter lim="800000"/>
+        </a:ln>
+      </a:lnStyleLst>
+      <a:effectStyleLst>
+        <a:effectStyle>
+          <a:effectLst/>
+        </a:effectStyle>
+        <a:effectStyle>
+          <a:effectLst/>
+        </a:effectStyle>
+        <a:effectStyle>
+          <a:effectLst>
+            <a:outerShdw blurRad="57150" dist="19050" dir="5400000" algn="ctr" rotWithShape="0">
+              <a:srgbClr val="000000">
+                <a:alpha val="63000"/>
+              </a:srgbClr>
+            </a:outerShdw>
+          </a:effectLst>
+        </a:effectStyle>
+      </a:effectStyleLst>
+      <a:bgFillStyleLst>
+        <a:solidFill>
+          <a:schemeClr val="phClr"/>
+        </a:solidFill>
+        <a:solidFill>
+          <a:schemeClr val="phClr">
+            <a:tint val="95000"/>
+            <a:satMod val="170000"/>
+          </a:schemeClr>
+        </a:solidFill>
+        <a:gradFill rotWithShape="1">
+          <a:gsLst>
+            <a:gs pos="0">
+              <a:schemeClr val="phClr">
+                <a:tint val="93000"/>
+                <a:satMod val="150000"/>
+                <a:shade val="98000"/>
+                <a:lumMod val="102000"/>
+              </a:schemeClr>
+            </a:gs>
+            <a:gs pos="50000">
+              <a:schemeClr val="phClr">
+                <a:tint val="98000"/>
+                <a:satMod val="130000"/>
+                <a:shade val="90000"/>
+                <a:lumMod val="103000"/>
+              </a:schemeClr>
+            </a:gs>
+            <a:gs pos="100000">
+              <a:schemeClr val="phClr">
+                <a:shade val="63000"/>
+                <a:satMod val="120000"/>
+              </a:schemeClr>
+            </a:gs>
+          </a:gsLst>
+          <a:lin ang="5400000" scaled="0"/>
+        </a:gradFill>
+      </a:bgFillStyleLst>
+    </a:fmtScheme>
+  </a:themeElements>
+  <a:objectDefaults/>
+  <a:extraClrSchemeLst/>
+  <a:extLst>
+    <a:ext uri="{05A4C25C-085E-4340-85A3-A5531E510DB2}">
+      <thm15:themeFamily xmlns:thm15="http://schemas.microsoft.com/office/thememl/2012/main" name="Office Theme" id="{62F939B6-93AF-4DB8-9C6B-D6C7DFDC589F}" vid="{4A3C46E8-61CC-4603-A589-7422A47A8E4A}"/>
+    </a:ext>
+  </a:extLst>
+</a:theme>
 </file>
</xml_diff>

<commit_message>
🐛 FIX: Makefile - error on debian
</commit_message>
<xml_diff>
--- a/doc/Presentation.pptx
+++ b/doc/Presentation.pptx
@@ -5,22 +5,20 @@
     <p:sldMasterId id="2147483648" r:id="rId1"/>
   </p:sldMasterIdLst>
   <p:notesMasterIdLst>
-    <p:notesMasterId r:id="rId12"/>
+    <p:notesMasterId r:id="rId10"/>
   </p:notesMasterIdLst>
   <p:handoutMasterIdLst>
-    <p:handoutMasterId r:id="rId13"/>
+    <p:handoutMasterId r:id="rId11"/>
   </p:handoutMasterIdLst>
   <p:sldIdLst>
     <p:sldId id="256" r:id="rId2"/>
     <p:sldId id="257" r:id="rId3"/>
     <p:sldId id="258" r:id="rId4"/>
     <p:sldId id="265" r:id="rId5"/>
-    <p:sldId id="259" r:id="rId6"/>
-    <p:sldId id="266" r:id="rId7"/>
-    <p:sldId id="260" r:id="rId8"/>
-    <p:sldId id="268" r:id="rId9"/>
-    <p:sldId id="263" r:id="rId10"/>
-    <p:sldId id="267" r:id="rId11"/>
+    <p:sldId id="266" r:id="rId6"/>
+    <p:sldId id="260" r:id="rId7"/>
+    <p:sldId id="268" r:id="rId8"/>
+    <p:sldId id="263" r:id="rId9"/>
   </p:sldIdLst>
   <p:sldSz cx="12192000" cy="6858000"/>
   <p:notesSz cx="6858000" cy="9144000"/>
@@ -738,7 +736,7 @@
           <a:p>
             <a:fld id="{AE31EE29-0DFF-4918-89F9-3D692DCB0B7B}" type="slidenum">
               <a:rPr lang="fr-FR" smtClean="0"/>
-              <a:t>6</a:t>
+              <a:t>5</a:t>
             </a:fld>
             <a:endParaRPr lang="fr-FR"/>
           </a:p>
@@ -2106,130 +2104,6 @@
   <p:clrMapOvr>
     <a:masterClrMapping/>
   </p:clrMapOvr>
-  <p:transition spd="slow">
-    <p:wipe dir="r"/>
-  </p:transition>
-</p:sld>
-</file>
-
-<file path=ppt/slides/slide10.xml><?xml version="1.0" encoding="utf-8"?>
-<p:sld xmlns:a="http://schemas.openxmlformats.org/drawingml/2006/main" xmlns:r="http://schemas.openxmlformats.org/officeDocument/2006/relationships" xmlns:p="http://schemas.openxmlformats.org/presentationml/2006/main">
-  <p:cSld>
-    <p:spTree>
-      <p:nvGrpSpPr>
-        <p:cNvPr id="1" name=""/>
-        <p:cNvGrpSpPr/>
-        <p:nvPr/>
-      </p:nvGrpSpPr>
-      <p:grpSpPr>
-        <a:xfrm>
-          <a:off x="0" y="0"/>
-          <a:ext cx="0" cy="0"/>
-          <a:chOff x="0" y="0"/>
-          <a:chExt cx="0" cy="0"/>
-        </a:xfrm>
-      </p:grpSpPr>
-      <p:sp>
-        <p:nvSpPr>
-          <p:cNvPr id="2" name="Titre 1"/>
-          <p:cNvSpPr>
-            <a:spLocks noGrp="1"/>
-          </p:cNvSpPr>
-          <p:nvPr>
-            <p:ph type="title"/>
-          </p:nvPr>
-        </p:nvSpPr>
-        <p:spPr>
-          <a:xfrm>
-            <a:off x="838200" y="365125"/>
-            <a:ext cx="10515600" cy="1325563"/>
-          </a:xfrm>
-        </p:spPr>
-        <p:txBody>
-          <a:bodyPr/>
-          <a:lstStyle/>
-          <a:p>
-            <a:r>
-              <a:rPr lang="fr-FR" dirty="0"/>
-              <a:t>Démonstration</a:t>
-            </a:r>
-          </a:p>
-        </p:txBody>
-      </p:sp>
-      <p:sp>
-        <p:nvSpPr>
-          <p:cNvPr id="4" name="ZoneTexte 3"/>
-          <p:cNvSpPr txBox="1"/>
-          <p:nvPr/>
-        </p:nvSpPr>
-        <p:spPr>
-          <a:xfrm>
-            <a:off x="11530263" y="6488668"/>
-            <a:ext cx="661737" cy="369332"/>
-          </a:xfrm>
-          <a:prstGeom prst="rect">
-            <a:avLst/>
-          </a:prstGeom>
-          <a:noFill/>
-        </p:spPr>
-        <p:txBody>
-          <a:bodyPr wrap="square" rtlCol="0">
-            <a:spAutoFit/>
-          </a:bodyPr>
-          <a:lstStyle/>
-          <a:p>
-            <a:r>
-              <a:rPr lang="fr-FR" b="1" dirty="0">
-                <a:solidFill>
-                  <a:schemeClr val="bg1"/>
-                </a:solidFill>
-                <a:latin typeface="Tw Cen MT Condensed" panose="020B0606020104020203" pitchFamily="34" charset="0"/>
-              </a:rPr>
-              <a:t>9</a:t>
-            </a:r>
-          </a:p>
-        </p:txBody>
-      </p:sp>
-      <p:pic>
-        <p:nvPicPr>
-          <p:cNvPr id="5" name="Image 4"/>
-          <p:cNvPicPr>
-            <a:picLocks noChangeAspect="1"/>
-          </p:cNvPicPr>
-          <p:nvPr/>
-        </p:nvPicPr>
-        <p:blipFill>
-          <a:blip r:embed="rId2">
-            <a:extLst>
-              <a:ext uri="{28A0092B-C50C-407E-A947-70E740481C1C}">
-                <a14:useLocalDpi xmlns:a14="http://schemas.microsoft.com/office/drawing/2010/main" val="0"/>
-              </a:ext>
-            </a:extLst>
-          </a:blip>
-          <a:stretch>
-            <a:fillRect/>
-          </a:stretch>
-        </p:blipFill>
-        <p:spPr>
-          <a:xfrm>
-            <a:off x="1669383" y="2046708"/>
-            <a:ext cx="8853233" cy="3909172"/>
-          </a:xfrm>
-          <a:prstGeom prst="rect">
-            <a:avLst/>
-          </a:prstGeom>
-        </p:spPr>
-      </p:pic>
-    </p:spTree>
-    <p:extLst>
-      <p:ext uri="{BB962C8B-B14F-4D97-AF65-F5344CB8AC3E}">
-        <p14:creationId xmlns:p14="http://schemas.microsoft.com/office/powerpoint/2010/main" val="2033206879"/>
-      </p:ext>
-    </p:extLst>
-  </p:cSld>
-  <p:clrMapOvr>
-    <a:masterClrMapping/>
-  </p:clrMapOvr>
   <mc:AlternateContent xmlns:mc="http://schemas.openxmlformats.org/markup-compatibility/2006">
     <mc:Choice xmlns:p14="http://schemas.microsoft.com/office/powerpoint/2010/main" Requires="p14">
       <p:transition p14:dur="0"/>
@@ -2301,62 +2175,35 @@
             <p:ph idx="1"/>
           </p:nvPr>
         </p:nvSpPr>
-        <p:spPr/>
+        <p:spPr>
+          <a:xfrm>
+            <a:off x="1991308" y="2103437"/>
+            <a:ext cx="5721220" cy="1325563"/>
+          </a:xfrm>
+        </p:spPr>
         <p:txBody>
           <a:bodyPr/>
           <a:lstStyle/>
           <a:p>
-            <a:r>
-              <a:rPr lang="fr-FR" dirty="0"/>
-              <a:t> Objectif</a:t>
-            </a:r>
-          </a:p>
-          <a:p>
-            <a:pPr lvl="1"/>
-            <a:r>
-              <a:rPr lang="fr-FR" dirty="0"/>
-              <a:t> </a:t>
-            </a:r>
-          </a:p>
-          <a:p>
-            <a:pPr marL="457200" lvl="1" indent="0">
+            <a:pPr marL="0" indent="0" algn="ctr">
               <a:buNone/>
             </a:pPr>
-            <a:endParaRPr lang="fr-FR" dirty="0"/>
-          </a:p>
-          <a:p>
             <a:r>
               <a:rPr lang="fr-FR" dirty="0"/>
-              <a:t> Ce que l’on a réalisé</a:t>
-            </a:r>
-          </a:p>
-          <a:p>
-            <a:pPr lvl="1"/>
+              <a:t>Programme en </a:t>
+            </a:r>
+            <a:r>
+              <a:rPr lang="fr-FR" b="1" dirty="0"/>
+              <a:t>language C </a:t>
+            </a:r>
             <a:r>
               <a:rPr lang="fr-FR" dirty="0"/>
-              <a:t> Un jeu de combat</a:t>
-            </a:r>
-          </a:p>
-          <a:p>
-            <a:pPr lvl="1"/>
-            <a:r>
-              <a:rPr lang="fr-FR" dirty="0"/>
-              <a:t> Un Joueur contre une « Intelligence Artificielle »</a:t>
-            </a:r>
-          </a:p>
-          <a:p>
-            <a:pPr lvl="1"/>
-            <a:r>
-              <a:rPr lang="fr-FR" dirty="0"/>
-              <a:t> Un contrôle du joueur avec une caméra et des « tags »</a:t>
-            </a:r>
-          </a:p>
-          <a:p>
-            <a:pPr lvl="1"/>
-            <a:endParaRPr lang="fr-FR" dirty="0"/>
-          </a:p>
-          <a:p>
-            <a:endParaRPr lang="fr-FR" dirty="0"/>
+              <a:t>permettant de gérer un système de </a:t>
+            </a:r>
+            <a:r>
+              <a:rPr lang="fr-FR" i="1" dirty="0"/>
+              <a:t>comptes bancaires</a:t>
+            </a:r>
           </a:p>
         </p:txBody>
       </p:sp>
@@ -2390,6 +2237,94 @@
                 <a:latin typeface="Tw Cen MT Condensed" panose="020B0606020104020203" pitchFamily="34" charset="0"/>
               </a:rPr>
               <a:t>1</a:t>
+            </a:r>
+          </a:p>
+        </p:txBody>
+      </p:sp>
+      <p:sp>
+        <p:nvSpPr>
+          <p:cNvPr id="8" name="ZoneTexte 7">
+            <a:extLst>
+              <a:ext uri="{FF2B5EF4-FFF2-40B4-BE49-F238E27FC236}">
+                <a16:creationId xmlns:a16="http://schemas.microsoft.com/office/drawing/2014/main" id="{7FCC003C-3796-4DE1-9AF0-3BE4AEA23E5C}"/>
+              </a:ext>
+            </a:extLst>
+          </p:cNvPr>
+          <p:cNvSpPr txBox="1"/>
+          <p:nvPr/>
+        </p:nvSpPr>
+        <p:spPr>
+          <a:xfrm>
+            <a:off x="7959010" y="1833094"/>
+            <a:ext cx="3144417" cy="646331"/>
+          </a:xfrm>
+          <a:prstGeom prst="rect">
+            <a:avLst/>
+          </a:prstGeom>
+          <a:noFill/>
+        </p:spPr>
+        <p:txBody>
+          <a:bodyPr wrap="square" rtlCol="0">
+            <a:spAutoFit/>
+          </a:bodyPr>
+          <a:lstStyle/>
+          <a:p>
+            <a:pPr algn="ctr"/>
+            <a:r>
+              <a:rPr lang="fr-FR" dirty="0"/>
+              <a:t>Utiliser au moins deux structures différentes</a:t>
+            </a:r>
+          </a:p>
+        </p:txBody>
+      </p:sp>
+      <p:sp>
+        <p:nvSpPr>
+          <p:cNvPr id="9" name="ZoneTexte 8">
+            <a:extLst>
+              <a:ext uri="{FF2B5EF4-FFF2-40B4-BE49-F238E27FC236}">
+                <a16:creationId xmlns:a16="http://schemas.microsoft.com/office/drawing/2014/main" id="{9674DA97-AA07-4B79-9CED-61B33D8F3693}"/>
+              </a:ext>
+            </a:extLst>
+          </p:cNvPr>
+          <p:cNvSpPr txBox="1"/>
+          <p:nvPr/>
+        </p:nvSpPr>
+        <p:spPr>
+          <a:xfrm>
+            <a:off x="4646644" y="4378575"/>
+            <a:ext cx="3312367" cy="646331"/>
+          </a:xfrm>
+          <a:prstGeom prst="rect">
+            <a:avLst/>
+          </a:prstGeom>
+          <a:noFill/>
+        </p:spPr>
+        <p:txBody>
+          <a:bodyPr wrap="square" rtlCol="0">
+            <a:spAutoFit/>
+          </a:bodyPr>
+          <a:lstStyle/>
+          <a:p>
+            <a:pPr algn="ctr"/>
+            <a:r>
+              <a:rPr lang="fr-FR" dirty="0"/>
+              <a:t>Utiliser le format </a:t>
+            </a:r>
+            <a:r>
+              <a:rPr lang="fr-FR" b="1" dirty="0"/>
+              <a:t>JSON</a:t>
+            </a:r>
+            <a:r>
+              <a:rPr lang="fr-FR" dirty="0"/>
+              <a:t> et </a:t>
+            </a:r>
+            <a:r>
+              <a:rPr lang="fr-FR" b="1" dirty="0"/>
+              <a:t>CSV</a:t>
+            </a:r>
+            <a:r>
+              <a:rPr lang="fr-FR" dirty="0"/>
+              <a:t> pour stocker des données</a:t>
             </a:r>
           </a:p>
         </p:txBody>
@@ -2406,7 +2341,7 @@
   </p:clrMapOvr>
   <mc:AlternateContent xmlns:mc="http://schemas.openxmlformats.org/markup-compatibility/2006">
     <mc:Choice xmlns:p14="http://schemas.microsoft.com/office/powerpoint/2010/main" Requires="p14">
-      <p:transition p14:dur="0"/>
+      <p:transition p14:dur="10"/>
     </mc:Choice>
     <mc:Fallback>
       <p:transition/>
@@ -2480,7 +2415,12 @@
             <p:ph idx="1"/>
           </p:nvPr>
         </p:nvSpPr>
-        <p:spPr/>
+        <p:spPr>
+          <a:xfrm>
+            <a:off x="838200" y="1633542"/>
+            <a:ext cx="10515600" cy="3521627"/>
+          </a:xfrm>
+        </p:spPr>
         <p:txBody>
           <a:bodyPr/>
           <a:lstStyle/>
@@ -2932,61 +2872,6 @@
       </p:sp>
       <p:sp>
         <p:nvSpPr>
-          <p:cNvPr id="3" name="Espace réservé du contenu 2"/>
-          <p:cNvSpPr>
-            <a:spLocks noGrp="1"/>
-          </p:cNvSpPr>
-          <p:nvPr>
-            <p:ph idx="1"/>
-          </p:nvPr>
-        </p:nvSpPr>
-        <p:spPr/>
-        <p:txBody>
-          <a:bodyPr/>
-          <a:lstStyle/>
-          <a:p>
-            <a:r>
-              <a:rPr lang="fr-FR" dirty="0"/>
-              <a:t> </a:t>
-            </a:r>
-            <a:r>
-              <a:rPr lang="fr-FR" b="1" dirty="0"/>
-              <a:t>Itérative</a:t>
-            </a:r>
-            <a:r>
-              <a:rPr lang="fr-FR" dirty="0"/>
-              <a:t> : du plus simple (déplacement d’une forme) au plus complexe (le jeu complet)</a:t>
-            </a:r>
-          </a:p>
-          <a:p>
-            <a:endParaRPr lang="fr-FR" dirty="0"/>
-          </a:p>
-          <a:p>
-            <a:r>
-              <a:rPr lang="fr-FR" dirty="0"/>
-              <a:t>Utilisation d’une machine à états (</a:t>
-            </a:r>
-            <a:r>
-              <a:rPr lang="fr-FR" i="1" dirty="0"/>
-              <a:t>FSM : </a:t>
-            </a:r>
-            <a:r>
-              <a:rPr lang="fr-FR" i="1" dirty="0" err="1"/>
-              <a:t>Finite</a:t>
-            </a:r>
-            <a:r>
-              <a:rPr lang="fr-FR" i="1" dirty="0"/>
-              <a:t> State Machine</a:t>
-            </a:r>
-            <a:r>
-              <a:rPr lang="fr-FR" dirty="0"/>
-              <a:t>) pour permettre de modifier le comportement interactif</a:t>
-            </a:r>
-          </a:p>
-        </p:txBody>
-      </p:sp>
-      <p:sp>
-        <p:nvSpPr>
           <p:cNvPr id="4" name="ZoneTexte 3"/>
           <p:cNvSpPr txBox="1"/>
           <p:nvPr/>
@@ -3016,6 +2901,31 @@
               </a:rPr>
               <a:t>3</a:t>
             </a:r>
+          </a:p>
+        </p:txBody>
+      </p:sp>
+      <p:sp>
+        <p:nvSpPr>
+          <p:cNvPr id="8" name="Espace réservé du contenu 7">
+            <a:extLst>
+              <a:ext uri="{FF2B5EF4-FFF2-40B4-BE49-F238E27FC236}">
+                <a16:creationId xmlns:a16="http://schemas.microsoft.com/office/drawing/2014/main" id="{6A2F85B4-49D1-4C4C-8354-ED221A7A1F4A}"/>
+              </a:ext>
+            </a:extLst>
+          </p:cNvPr>
+          <p:cNvSpPr>
+            <a:spLocks noGrp="1"/>
+          </p:cNvSpPr>
+          <p:nvPr>
+            <p:ph idx="1"/>
+          </p:nvPr>
+        </p:nvSpPr>
+        <p:spPr/>
+        <p:txBody>
+          <a:bodyPr/>
+          <a:lstStyle/>
+          <a:p>
+            <a:endParaRPr lang="en-US"/>
           </a:p>
         </p:txBody>
       </p:sp>
@@ -3079,7 +2989,7 @@
           <a:p>
             <a:r>
               <a:rPr lang="fr-FR" dirty="0"/>
-              <a:t>Comment cela fonctionne ?</a:t>
+              <a:t>Comment ça marche ?</a:t>
             </a:r>
             <a:br>
               <a:rPr lang="fr-FR" dirty="0"/>
@@ -3090,78 +3000,7 @@
       </p:sp>
       <p:sp>
         <p:nvSpPr>
-          <p:cNvPr id="3" name="Espace réservé du contenu 2"/>
-          <p:cNvSpPr>
-            <a:spLocks noGrp="1"/>
-          </p:cNvSpPr>
-          <p:nvPr>
-            <p:ph idx="1"/>
-          </p:nvPr>
-        </p:nvSpPr>
-        <p:spPr/>
-        <p:txBody>
-          <a:bodyPr/>
-          <a:lstStyle/>
-          <a:p>
-            <a:r>
-              <a:rPr lang="fr-FR" dirty="0"/>
-              <a:t>Processing offre une boucle infinie (</a:t>
-            </a:r>
-            <a:r>
-              <a:rPr lang="fr-FR" i="1" dirty="0" err="1"/>
-              <a:t>loop</a:t>
-            </a:r>
-            <a:r>
-              <a:rPr lang="fr-FR" i="1" dirty="0"/>
-              <a:t>()</a:t>
-            </a:r>
-            <a:r>
-              <a:rPr lang="fr-FR" dirty="0"/>
-              <a:t>) pour afficher les données</a:t>
-            </a:r>
-          </a:p>
-          <a:p>
-            <a:pPr marL="0" indent="0">
-              <a:buNone/>
-            </a:pPr>
-            <a:endParaRPr lang="fr-FR" dirty="0"/>
-          </a:p>
-          <a:p>
-            <a:r>
-              <a:rPr lang="fr-FR" dirty="0"/>
-              <a:t>On définit différents états qui permettent d’avoir un effet d’animation</a:t>
-            </a:r>
-          </a:p>
-          <a:p>
-            <a:pPr lvl="1"/>
-            <a:r>
-              <a:rPr lang="fr-FR" dirty="0"/>
-              <a:t> Ex : En cliquant (événement </a:t>
-            </a:r>
-            <a:r>
-              <a:rPr lang="fr-FR" i="1" dirty="0" err="1"/>
-              <a:t>mousePressed</a:t>
-            </a:r>
-            <a:r>
-              <a:rPr lang="fr-FR" i="1" dirty="0"/>
-              <a:t>()</a:t>
-            </a:r>
-            <a:r>
-              <a:rPr lang="fr-FR" dirty="0"/>
-              <a:t>) sur un item de menu, on passe au jeu (nouvel état)</a:t>
-            </a:r>
-          </a:p>
-          <a:p>
-            <a:pPr marL="0" indent="0">
-              <a:buNone/>
-            </a:pPr>
-            <a:endParaRPr lang="fr-FR" dirty="0"/>
-          </a:p>
-        </p:txBody>
-      </p:sp>
-      <p:sp>
-        <p:nvSpPr>
-          <p:cNvPr id="4" name="ZoneTexte 3"/>
+          <p:cNvPr id="8" name="ZoneTexte 7"/>
           <p:cNvSpPr txBox="1"/>
           <p:nvPr/>
         </p:nvSpPr>
@@ -3188,15 +3027,45 @@
                 </a:solidFill>
                 <a:latin typeface="Tw Cen MT Condensed" panose="020B0606020104020203" pitchFamily="34" charset="0"/>
               </a:rPr>
-              <a:t>4</a:t>
-            </a:r>
-          </a:p>
-        </p:txBody>
-      </p:sp>
+              <a:t>5</a:t>
+            </a:r>
+          </a:p>
+        </p:txBody>
+      </p:sp>
+      <p:pic>
+        <p:nvPicPr>
+          <p:cNvPr id="11" name="Image 10">
+            <a:extLst>
+              <a:ext uri="{FF2B5EF4-FFF2-40B4-BE49-F238E27FC236}">
+                <a16:creationId xmlns:a16="http://schemas.microsoft.com/office/drawing/2014/main" id="{67668305-2C7D-4AD5-8646-68E3FFEFC85D}"/>
+              </a:ext>
+            </a:extLst>
+          </p:cNvPr>
+          <p:cNvPicPr>
+            <a:picLocks noChangeAspect="1"/>
+          </p:cNvPicPr>
+          <p:nvPr/>
+        </p:nvPicPr>
+        <p:blipFill>
+          <a:blip r:embed="rId3"/>
+          <a:stretch>
+            <a:fillRect/>
+          </a:stretch>
+        </p:blipFill>
+        <p:spPr>
+          <a:xfrm>
+            <a:off x="2918230" y="365125"/>
+            <a:ext cx="7041109" cy="5691732"/>
+          </a:xfrm>
+          <a:prstGeom prst="rect">
+            <a:avLst/>
+          </a:prstGeom>
+        </p:spPr>
+      </p:pic>
     </p:spTree>
     <p:extLst>
       <p:ext uri="{BB962C8B-B14F-4D97-AF65-F5344CB8AC3E}">
-        <p14:creationId xmlns:p14="http://schemas.microsoft.com/office/powerpoint/2010/main" val="3701932262"/>
+        <p14:creationId xmlns:p14="http://schemas.microsoft.com/office/powerpoint/2010/main" val="4272607345"/>
       </p:ext>
     </p:extLst>
   </p:cSld>
@@ -3253,7 +3122,7 @@
           <a:p>
             <a:r>
               <a:rPr lang="fr-FR" dirty="0"/>
-              <a:t>Comment cela fonctionne ?</a:t>
+              <a:t>Stockage des données – Pendant l’exécution</a:t>
             </a:r>
             <a:br>
               <a:rPr lang="fr-FR" dirty="0"/>
@@ -3264,7 +3133,7 @@
       </p:sp>
       <p:sp>
         <p:nvSpPr>
-          <p:cNvPr id="8" name="ZoneTexte 7"/>
+          <p:cNvPr id="6" name="ZoneTexte 5"/>
           <p:cNvSpPr txBox="1"/>
           <p:nvPr/>
         </p:nvSpPr>
@@ -3291,45 +3160,40 @@
                 </a:solidFill>
                 <a:latin typeface="Tw Cen MT Condensed" panose="020B0606020104020203" pitchFamily="34" charset="0"/>
               </a:rPr>
-              <a:t>5</a:t>
-            </a:r>
-          </a:p>
-        </p:txBody>
-      </p:sp>
-      <p:pic>
-        <p:nvPicPr>
-          <p:cNvPr id="10" name="Image 9">
+              <a:t>6</a:t>
+            </a:r>
+          </a:p>
+        </p:txBody>
+      </p:sp>
+      <p:sp>
+        <p:nvSpPr>
+          <p:cNvPr id="8" name="Espace réservé du contenu 7">
             <a:extLst>
               <a:ext uri="{FF2B5EF4-FFF2-40B4-BE49-F238E27FC236}">
-                <a16:creationId xmlns:a16="http://schemas.microsoft.com/office/drawing/2014/main" id="{0F95461A-5DA0-4C1F-943B-B9BE34236C8A}"/>
+                <a16:creationId xmlns:a16="http://schemas.microsoft.com/office/drawing/2014/main" id="{97B5A499-DCA0-4323-BBA3-7B12DC020488}"/>
               </a:ext>
             </a:extLst>
           </p:cNvPr>
-          <p:cNvPicPr>
-            <a:picLocks noChangeAspect="1"/>
-          </p:cNvPicPr>
-          <p:nvPr/>
-        </p:nvPicPr>
-        <p:blipFill>
-          <a:blip r:embed="rId3"/>
-          <a:stretch>
-            <a:fillRect/>
-          </a:stretch>
-        </p:blipFill>
-        <p:spPr>
-          <a:xfrm>
-            <a:off x="3009632" y="933233"/>
-            <a:ext cx="6172735" cy="4991533"/>
-          </a:xfrm>
-          <a:prstGeom prst="rect">
-            <a:avLst/>
-          </a:prstGeom>
-        </p:spPr>
-      </p:pic>
+          <p:cNvSpPr>
+            <a:spLocks noGrp="1"/>
+          </p:cNvSpPr>
+          <p:nvPr>
+            <p:ph idx="1"/>
+          </p:nvPr>
+        </p:nvSpPr>
+        <p:spPr/>
+        <p:txBody>
+          <a:bodyPr/>
+          <a:lstStyle/>
+          <a:p>
+            <a:endParaRPr lang="en-US"/>
+          </a:p>
+        </p:txBody>
+      </p:sp>
     </p:spTree>
     <p:extLst>
       <p:ext uri="{BB962C8B-B14F-4D97-AF65-F5344CB8AC3E}">
-        <p14:creationId xmlns:p14="http://schemas.microsoft.com/office/powerpoint/2010/main" val="4272607345"/>
+        <p14:creationId xmlns:p14="http://schemas.microsoft.com/office/powerpoint/2010/main" val="1550612960"/>
       </p:ext>
     </p:extLst>
   </p:cSld>
@@ -3386,44 +3250,12 @@
           <a:p>
             <a:r>
               <a:rPr lang="fr-FR" dirty="0"/>
-              <a:t>Des Structures – </a:t>
-            </a:r>
-            <a:r>
-              <a:rPr lang="fr-FR" dirty="0" err="1"/>
-              <a:t>User_account</a:t>
+              <a:t>Stockage des données – Après l’exécution</a:t>
             </a:r>
             <a:br>
               <a:rPr lang="fr-FR" dirty="0"/>
             </a:br>
             <a:endParaRPr lang="fr-FR" dirty="0"/>
-          </a:p>
-        </p:txBody>
-      </p:sp>
-      <p:sp>
-        <p:nvSpPr>
-          <p:cNvPr id="3" name="Espace réservé du contenu 2"/>
-          <p:cNvSpPr>
-            <a:spLocks noGrp="1"/>
-          </p:cNvSpPr>
-          <p:nvPr>
-            <p:ph idx="1"/>
-          </p:nvPr>
-        </p:nvSpPr>
-        <p:spPr/>
-        <p:txBody>
-          <a:bodyPr/>
-          <a:lstStyle/>
-          <a:p>
-            <a:r>
-              <a:rPr lang="fr-FR" dirty="0"/>
-              <a:t> Le déplacement par les flèches du clavier</a:t>
-            </a:r>
-          </a:p>
-          <a:p>
-            <a:r>
-              <a:rPr lang="fr-FR" dirty="0"/>
-              <a:t> Le saut (avec une animation)</a:t>
-            </a:r>
           </a:p>
         </p:txBody>
       </p:sp>
@@ -3461,10 +3293,35 @@
           </a:p>
         </p:txBody>
       </p:sp>
+      <p:sp>
+        <p:nvSpPr>
+          <p:cNvPr id="8" name="Espace réservé du contenu 7">
+            <a:extLst>
+              <a:ext uri="{FF2B5EF4-FFF2-40B4-BE49-F238E27FC236}">
+                <a16:creationId xmlns:a16="http://schemas.microsoft.com/office/drawing/2014/main" id="{C2093F0F-DBE6-4435-B943-4EB7E691C45E}"/>
+              </a:ext>
+            </a:extLst>
+          </p:cNvPr>
+          <p:cNvSpPr>
+            <a:spLocks noGrp="1"/>
+          </p:cNvSpPr>
+          <p:nvPr>
+            <p:ph idx="1"/>
+          </p:nvPr>
+        </p:nvSpPr>
+        <p:spPr/>
+        <p:txBody>
+          <a:bodyPr/>
+          <a:lstStyle/>
+          <a:p>
+            <a:endParaRPr lang="en-US"/>
+          </a:p>
+        </p:txBody>
+      </p:sp>
     </p:spTree>
     <p:extLst>
       <p:ext uri="{BB962C8B-B14F-4D97-AF65-F5344CB8AC3E}">
-        <p14:creationId xmlns:p14="http://schemas.microsoft.com/office/powerpoint/2010/main" val="1550612960"/>
+        <p14:creationId xmlns:p14="http://schemas.microsoft.com/office/powerpoint/2010/main" val="2653334038"/>
       </p:ext>
     </p:extLst>
   </p:cSld>
@@ -3521,11 +3378,7 @@
           <a:p>
             <a:r>
               <a:rPr lang="fr-FR" dirty="0"/>
-              <a:t>Des Structures – </a:t>
-            </a:r>
-            <a:r>
-              <a:rPr lang="fr-FR" dirty="0" err="1"/>
-              <a:t>Account</a:t>
+              <a:t>Conclusion</a:t>
             </a:r>
             <a:br>
               <a:rPr lang="fr-FR" dirty="0"/>
@@ -3536,35 +3389,7 @@
       </p:sp>
       <p:sp>
         <p:nvSpPr>
-          <p:cNvPr id="3" name="Espace réservé du contenu 2"/>
-          <p:cNvSpPr>
-            <a:spLocks noGrp="1"/>
-          </p:cNvSpPr>
-          <p:nvPr>
-            <p:ph idx="1"/>
-          </p:nvPr>
-        </p:nvSpPr>
-        <p:spPr/>
-        <p:txBody>
-          <a:bodyPr/>
-          <a:lstStyle/>
-          <a:p>
-            <a:r>
-              <a:rPr lang="fr-FR" dirty="0"/>
-              <a:t> Le déplacement par les flèches du clavier</a:t>
-            </a:r>
-          </a:p>
-          <a:p>
-            <a:r>
-              <a:rPr lang="fr-FR" dirty="0"/>
-              <a:t> Le saut (avec une animation)</a:t>
-            </a:r>
-          </a:p>
-        </p:txBody>
-      </p:sp>
-      <p:sp>
-        <p:nvSpPr>
-          <p:cNvPr id="6" name="ZoneTexte 5"/>
+          <p:cNvPr id="4" name="ZoneTexte 3"/>
           <p:cNvSpPr txBox="1"/>
           <p:nvPr/>
         </p:nvSpPr>
@@ -3591,83 +3416,20 @@
                 </a:solidFill>
                 <a:latin typeface="Tw Cen MT Condensed" panose="020B0606020104020203" pitchFamily="34" charset="0"/>
               </a:rPr>
-              <a:t>6</a:t>
-            </a:r>
-          </a:p>
-        </p:txBody>
-      </p:sp>
-    </p:spTree>
-    <p:extLst>
-      <p:ext uri="{BB962C8B-B14F-4D97-AF65-F5344CB8AC3E}">
-        <p14:creationId xmlns:p14="http://schemas.microsoft.com/office/powerpoint/2010/main" val="2653334038"/>
-      </p:ext>
-    </p:extLst>
-  </p:cSld>
-  <p:clrMapOvr>
-    <a:masterClrMapping/>
-  </p:clrMapOvr>
-  <mc:AlternateContent xmlns:mc="http://schemas.openxmlformats.org/markup-compatibility/2006">
-    <mc:Choice xmlns:p14="http://schemas.microsoft.com/office/powerpoint/2010/main" Requires="p14">
-      <p:transition p14:dur="0"/>
-    </mc:Choice>
-    <mc:Fallback>
-      <p:transition/>
-    </mc:Fallback>
-  </mc:AlternateContent>
-</p:sld>
-</file>
-
-<file path=ppt/slides/slide9.xml><?xml version="1.0" encoding="utf-8"?>
-<p:sld xmlns:a="http://schemas.openxmlformats.org/drawingml/2006/main" xmlns:r="http://schemas.openxmlformats.org/officeDocument/2006/relationships" xmlns:p="http://schemas.openxmlformats.org/presentationml/2006/main">
-  <p:cSld>
-    <p:spTree>
-      <p:nvGrpSpPr>
-        <p:cNvPr id="1" name=""/>
-        <p:cNvGrpSpPr/>
-        <p:nvPr/>
-      </p:nvGrpSpPr>
-      <p:grpSpPr>
-        <a:xfrm>
-          <a:off x="0" y="0"/>
-          <a:ext cx="0" cy="0"/>
-          <a:chOff x="0" y="0"/>
-          <a:chExt cx="0" cy="0"/>
-        </a:xfrm>
-      </p:grpSpPr>
-      <p:sp>
-        <p:nvSpPr>
-          <p:cNvPr id="2" name="Titre 1"/>
-          <p:cNvSpPr>
-            <a:spLocks noGrp="1"/>
-          </p:cNvSpPr>
-          <p:nvPr>
-            <p:ph type="title"/>
-          </p:nvPr>
-        </p:nvSpPr>
-        <p:spPr>
-          <a:xfrm>
-            <a:off x="838200" y="365125"/>
-            <a:ext cx="10515600" cy="1325563"/>
-          </a:xfrm>
-        </p:spPr>
-        <p:txBody>
-          <a:bodyPr/>
-          <a:lstStyle/>
-          <a:p>
-            <a:r>
-              <a:rPr lang="fr-FR" dirty="0"/>
-              <a:t>Conclusion</a:t>
-            </a:r>
-            <a:br>
-              <a:rPr lang="fr-FR" dirty="0"/>
-            </a:br>
-            <a:endParaRPr lang="fr-FR" dirty="0"/>
-          </a:p>
-        </p:txBody>
-      </p:sp>
-      <p:sp>
-        <p:nvSpPr>
-          <p:cNvPr id="3" name="Espace réservé du contenu 2"/>
+              <a:t>8</a:t>
+            </a:r>
+          </a:p>
+        </p:txBody>
+      </p:sp>
+      <p:sp>
+        <p:nvSpPr>
+          <p:cNvPr id="8" name="Espace réservé du contenu 7">
+            <a:extLst>
+              <a:ext uri="{FF2B5EF4-FFF2-40B4-BE49-F238E27FC236}">
+                <a16:creationId xmlns:a16="http://schemas.microsoft.com/office/drawing/2014/main" id="{1555A31B-4396-4B59-A0E9-E5D32B7718F0}"/>
+              </a:ext>
+            </a:extLst>
+          </p:cNvPr>
           <p:cNvSpPr>
             <a:spLocks noGrp="1"/>
           </p:cNvSpPr>
@@ -3675,126 +3437,12 @@
             <p:ph idx="1"/>
           </p:nvPr>
         </p:nvSpPr>
-        <p:spPr>
-          <a:xfrm>
-            <a:off x="838200" y="1714673"/>
-            <a:ext cx="10515600" cy="4351338"/>
-          </a:xfrm>
-        </p:spPr>
-        <p:txBody>
-          <a:bodyPr>
-            <a:normAutofit lnSpcReduction="10000"/>
-          </a:bodyPr>
+        <p:spPr/>
+        <p:txBody>
+          <a:bodyPr/>
           <a:lstStyle/>
           <a:p>
-            <a:r>
-              <a:rPr lang="fr-FR" dirty="0"/>
-              <a:t>Il resterait à compléter le jeu</a:t>
-            </a:r>
-          </a:p>
-          <a:p>
-            <a:pPr lvl="1"/>
-            <a:r>
-              <a:rPr lang="fr-FR" dirty="0"/>
-              <a:t>Par améliorer l’intelligence de l’IA</a:t>
-            </a:r>
-          </a:p>
-          <a:p>
-            <a:pPr lvl="1"/>
-            <a:r>
-              <a:rPr lang="fr-FR" dirty="0"/>
-              <a:t>Permettre le combat de deux joueurs « humains »</a:t>
-            </a:r>
-          </a:p>
-          <a:p>
-            <a:pPr lvl="1"/>
-            <a:endParaRPr lang="fr-FR" dirty="0"/>
-          </a:p>
-          <a:p>
-            <a:r>
-              <a:rPr lang="fr-FR" dirty="0"/>
-              <a:t>Un bilan positif</a:t>
-            </a:r>
-          </a:p>
-          <a:p>
-            <a:pPr lvl="1"/>
-            <a:r>
-              <a:rPr lang="fr-FR" dirty="0"/>
-              <a:t>L’occasion de travailler avec </a:t>
-            </a:r>
-            <a:r>
-              <a:rPr lang="fr-FR" i="1" dirty="0"/>
-              <a:t>Processing</a:t>
-            </a:r>
-          </a:p>
-          <a:p>
-            <a:pPr lvl="1"/>
-            <a:r>
-              <a:rPr lang="fr-FR" dirty="0"/>
-              <a:t>Un vrai travail de groupe</a:t>
-            </a:r>
-          </a:p>
-          <a:p>
-            <a:pPr lvl="1"/>
-            <a:r>
-              <a:rPr lang="fr-FR" dirty="0"/>
-              <a:t>Un jeu qui fonctionne</a:t>
-            </a:r>
-          </a:p>
-          <a:p>
-            <a:pPr marL="0" indent="0">
-              <a:buNone/>
-            </a:pPr>
-            <a:endParaRPr lang="fr-FR" dirty="0"/>
-          </a:p>
-          <a:p>
-            <a:pPr marL="1371600" lvl="3" indent="0">
-              <a:buNone/>
-            </a:pPr>
-            <a:endParaRPr lang="fr-FR" dirty="0"/>
-          </a:p>
-          <a:p>
-            <a:pPr marL="1371600" lvl="3" indent="0">
-              <a:buNone/>
-            </a:pPr>
-            <a:r>
-              <a:rPr lang="fr-FR" dirty="0"/>
-              <a:t> </a:t>
-            </a:r>
-          </a:p>
-        </p:txBody>
-      </p:sp>
-      <p:sp>
-        <p:nvSpPr>
-          <p:cNvPr id="4" name="ZoneTexte 3"/>
-          <p:cNvSpPr txBox="1"/>
-          <p:nvPr/>
-        </p:nvSpPr>
-        <p:spPr>
-          <a:xfrm>
-            <a:off x="11530263" y="6488668"/>
-            <a:ext cx="661737" cy="369332"/>
-          </a:xfrm>
-          <a:prstGeom prst="rect">
-            <a:avLst/>
-          </a:prstGeom>
-          <a:noFill/>
-        </p:spPr>
-        <p:txBody>
-          <a:bodyPr wrap="square" rtlCol="0">
-            <a:spAutoFit/>
-          </a:bodyPr>
-          <a:lstStyle/>
-          <a:p>
-            <a:r>
-              <a:rPr lang="fr-FR" b="1" dirty="0">
-                <a:solidFill>
-                  <a:schemeClr val="bg1"/>
-                </a:solidFill>
-                <a:latin typeface="Tw Cen MT Condensed" panose="020B0606020104020203" pitchFamily="34" charset="0"/>
-              </a:rPr>
-              <a:t>8</a:t>
-            </a:r>
+            <a:endParaRPr lang="en-US"/>
           </a:p>
         </p:txBody>
       </p:sp>

</xml_diff>